<commit_message>
New plot of the case study
</commit_message>
<xml_diff>
--- a/output/paper0915/figure/Figures.pptx
+++ b/output/paper0915/figure/Figures.pptx
@@ -11,6 +11,7 @@
     <p:sldId id="256" r:id="rId5"/>
     <p:sldId id="259" r:id="rId6"/>
     <p:sldId id="262" r:id="rId7"/>
+    <p:sldId id="264" r:id="rId8"/>
   </p:sldIdLst>
   <p:sldSz cx="12192000" cy="6858000"/>
   <p:notesSz cx="6858000" cy="9144000"/>
@@ -246,7 +247,7 @@
           <a:p>
             <a:fld id="{35C5FA2C-692F-48D1-A2F8-67B0244C0896}" type="datetimeFigureOut">
               <a:rPr lang="zh-CN" altLang="en-US" smtClean="0"/>
-              <a:t>2020/12/13</a:t>
+              <a:t>2020/12/14</a:t>
             </a:fld>
             <a:endParaRPr lang="zh-CN" altLang="en-US"/>
           </a:p>
@@ -414,7 +415,7 @@
           <a:p>
             <a:fld id="{35C5FA2C-692F-48D1-A2F8-67B0244C0896}" type="datetimeFigureOut">
               <a:rPr lang="zh-CN" altLang="en-US" smtClean="0"/>
-              <a:t>2020/12/13</a:t>
+              <a:t>2020/12/14</a:t>
             </a:fld>
             <a:endParaRPr lang="zh-CN" altLang="en-US"/>
           </a:p>
@@ -592,7 +593,7 @@
           <a:p>
             <a:fld id="{35C5FA2C-692F-48D1-A2F8-67B0244C0896}" type="datetimeFigureOut">
               <a:rPr lang="zh-CN" altLang="en-US" smtClean="0"/>
-              <a:t>2020/12/13</a:t>
+              <a:t>2020/12/14</a:t>
             </a:fld>
             <a:endParaRPr lang="zh-CN" altLang="en-US"/>
           </a:p>
@@ -760,7 +761,7 @@
           <a:p>
             <a:fld id="{35C5FA2C-692F-48D1-A2F8-67B0244C0896}" type="datetimeFigureOut">
               <a:rPr lang="zh-CN" altLang="en-US" smtClean="0"/>
-              <a:t>2020/12/13</a:t>
+              <a:t>2020/12/14</a:t>
             </a:fld>
             <a:endParaRPr lang="zh-CN" altLang="en-US"/>
           </a:p>
@@ -1005,7 +1006,7 @@
           <a:p>
             <a:fld id="{35C5FA2C-692F-48D1-A2F8-67B0244C0896}" type="datetimeFigureOut">
               <a:rPr lang="zh-CN" altLang="en-US" smtClean="0"/>
-              <a:t>2020/12/13</a:t>
+              <a:t>2020/12/14</a:t>
             </a:fld>
             <a:endParaRPr lang="zh-CN" altLang="en-US"/>
           </a:p>
@@ -1234,7 +1235,7 @@
           <a:p>
             <a:fld id="{35C5FA2C-692F-48D1-A2F8-67B0244C0896}" type="datetimeFigureOut">
               <a:rPr lang="zh-CN" altLang="en-US" smtClean="0"/>
-              <a:t>2020/12/13</a:t>
+              <a:t>2020/12/14</a:t>
             </a:fld>
             <a:endParaRPr lang="zh-CN" altLang="en-US"/>
           </a:p>
@@ -1598,7 +1599,7 @@
           <a:p>
             <a:fld id="{35C5FA2C-692F-48D1-A2F8-67B0244C0896}" type="datetimeFigureOut">
               <a:rPr lang="zh-CN" altLang="en-US" smtClean="0"/>
-              <a:t>2020/12/13</a:t>
+              <a:t>2020/12/14</a:t>
             </a:fld>
             <a:endParaRPr lang="zh-CN" altLang="en-US"/>
           </a:p>
@@ -1715,7 +1716,7 @@
           <a:p>
             <a:fld id="{35C5FA2C-692F-48D1-A2F8-67B0244C0896}" type="datetimeFigureOut">
               <a:rPr lang="zh-CN" altLang="en-US" smtClean="0"/>
-              <a:t>2020/12/13</a:t>
+              <a:t>2020/12/14</a:t>
             </a:fld>
             <a:endParaRPr lang="zh-CN" altLang="en-US"/>
           </a:p>
@@ -1810,7 +1811,7 @@
           <a:p>
             <a:fld id="{35C5FA2C-692F-48D1-A2F8-67B0244C0896}" type="datetimeFigureOut">
               <a:rPr lang="zh-CN" altLang="en-US" smtClean="0"/>
-              <a:t>2020/12/13</a:t>
+              <a:t>2020/12/14</a:t>
             </a:fld>
             <a:endParaRPr lang="zh-CN" altLang="en-US"/>
           </a:p>
@@ -2085,7 +2086,7 @@
           <a:p>
             <a:fld id="{35C5FA2C-692F-48D1-A2F8-67B0244C0896}" type="datetimeFigureOut">
               <a:rPr lang="zh-CN" altLang="en-US" smtClean="0"/>
-              <a:t>2020/12/13</a:t>
+              <a:t>2020/12/14</a:t>
             </a:fld>
             <a:endParaRPr lang="zh-CN" altLang="en-US"/>
           </a:p>
@@ -2337,7 +2338,7 @@
           <a:p>
             <a:fld id="{35C5FA2C-692F-48D1-A2F8-67B0244C0896}" type="datetimeFigureOut">
               <a:rPr lang="zh-CN" altLang="en-US" smtClean="0"/>
-              <a:t>2020/12/13</a:t>
+              <a:t>2020/12/14</a:t>
             </a:fld>
             <a:endParaRPr lang="zh-CN" altLang="en-US"/>
           </a:p>
@@ -2548,7 +2549,7 @@
           <a:p>
             <a:fld id="{35C5FA2C-692F-48D1-A2F8-67B0244C0896}" type="datetimeFigureOut">
               <a:rPr lang="zh-CN" altLang="en-US" smtClean="0"/>
-              <a:t>2020/12/13</a:t>
+              <a:t>2020/12/14</a:t>
             </a:fld>
             <a:endParaRPr lang="zh-CN" altLang="en-US"/>
           </a:p>
@@ -5049,8 +5050,8 @@
           </a:p>
         </p:txBody>
       </p:sp>
-      <mc:AlternateContent xmlns:mc="http://schemas.openxmlformats.org/markup-compatibility/2006">
-        <mc:Choice xmlns:a14="http://schemas.microsoft.com/office/drawing/2010/main" Requires="a14">
+      <mc:AlternateContent xmlns:mc="http://schemas.openxmlformats.org/markup-compatibility/2006" xmlns:a14="http://schemas.microsoft.com/office/drawing/2010/main">
+        <mc:Choice Requires="a14">
           <p:sp>
             <p:nvSpPr>
               <p:cNvPr id="7" name="TextBox 3">
@@ -5119,7 +5120,7 @@
             </p:txBody>
           </p:sp>
         </mc:Choice>
-        <mc:Fallback>
+        <mc:Fallback xmlns="">
           <p:sp>
             <p:nvSpPr>
               <p:cNvPr id="7" name="TextBox 3">
@@ -5287,8 +5288,8 @@
           </a:fontRef>
         </p:style>
       </p:cxnSp>
-      <mc:AlternateContent xmlns:mc="http://schemas.openxmlformats.org/markup-compatibility/2006">
-        <mc:Choice xmlns:a14="http://schemas.microsoft.com/office/drawing/2010/main" Requires="a14">
+      <mc:AlternateContent xmlns:mc="http://schemas.openxmlformats.org/markup-compatibility/2006" xmlns:a14="http://schemas.microsoft.com/office/drawing/2010/main">
+        <mc:Choice Requires="a14">
           <p:sp>
             <p:nvSpPr>
               <p:cNvPr id="12" name="TextBox 29">
@@ -5357,7 +5358,7 @@
             </p:txBody>
           </p:sp>
         </mc:Choice>
-        <mc:Fallback>
+        <mc:Fallback xmlns="">
           <p:sp>
             <p:nvSpPr>
               <p:cNvPr id="12" name="TextBox 29">
@@ -5402,8 +5403,8 @@
           </p:sp>
         </mc:Fallback>
       </mc:AlternateContent>
-      <mc:AlternateContent xmlns:mc="http://schemas.openxmlformats.org/markup-compatibility/2006">
-        <mc:Choice xmlns:a14="http://schemas.microsoft.com/office/drawing/2010/main" Requires="a14">
+      <mc:AlternateContent xmlns:mc="http://schemas.openxmlformats.org/markup-compatibility/2006" xmlns:a14="http://schemas.microsoft.com/office/drawing/2010/main">
+        <mc:Choice Requires="a14">
           <p:sp>
             <p:nvSpPr>
               <p:cNvPr id="13" name="TextBox 30">
@@ -5472,7 +5473,7 @@
             </p:txBody>
           </p:sp>
         </mc:Choice>
-        <mc:Fallback>
+        <mc:Fallback xmlns="">
           <p:sp>
             <p:nvSpPr>
               <p:cNvPr id="13" name="TextBox 30">
@@ -5845,8 +5846,8 @@
           </a:fontRef>
         </p:style>
       </p:cxnSp>
-      <mc:AlternateContent xmlns:mc="http://schemas.openxmlformats.org/markup-compatibility/2006">
-        <mc:Choice xmlns:a14="http://schemas.microsoft.com/office/drawing/2010/main" Requires="a14">
+      <mc:AlternateContent xmlns:mc="http://schemas.openxmlformats.org/markup-compatibility/2006" xmlns:a14="http://schemas.microsoft.com/office/drawing/2010/main">
+        <mc:Choice Requires="a14">
           <p:sp>
             <p:nvSpPr>
               <p:cNvPr id="22" name="TextBox 40">
@@ -5915,7 +5916,7 @@
             </p:txBody>
           </p:sp>
         </mc:Choice>
-        <mc:Fallback>
+        <mc:Fallback xmlns="">
           <p:sp>
             <p:nvSpPr>
               <p:cNvPr id="22" name="TextBox 40">
@@ -9456,6 +9457,474 @@
 </p:sld>
 </file>
 
+<file path=ppt/slides/slide7.xml><?xml version="1.0" encoding="utf-8"?>
+<p:sld xmlns:a="http://schemas.openxmlformats.org/drawingml/2006/main" xmlns:r="http://schemas.openxmlformats.org/officeDocument/2006/relationships" xmlns:p="http://schemas.openxmlformats.org/presentationml/2006/main">
+  <p:cSld>
+    <p:spTree>
+      <p:nvGrpSpPr>
+        <p:cNvPr id="1" name=""/>
+        <p:cNvGrpSpPr/>
+        <p:nvPr/>
+      </p:nvGrpSpPr>
+      <p:grpSpPr>
+        <a:xfrm>
+          <a:off x="0" y="0"/>
+          <a:ext cx="0" cy="0"/>
+          <a:chOff x="0" y="0"/>
+          <a:chExt cx="0" cy="0"/>
+        </a:xfrm>
+      </p:grpSpPr>
+      <p:grpSp>
+        <p:nvGrpSpPr>
+          <p:cNvPr id="15" name="组合 14">
+            <a:extLst>
+              <a:ext uri="{FF2B5EF4-FFF2-40B4-BE49-F238E27FC236}">
+                <a16:creationId xmlns:a16="http://schemas.microsoft.com/office/drawing/2014/main" id="{31524AA8-6E6C-4B31-B904-52C0F03ED427}"/>
+              </a:ext>
+            </a:extLst>
+          </p:cNvPr>
+          <p:cNvGrpSpPr/>
+          <p:nvPr/>
+        </p:nvGrpSpPr>
+        <p:grpSpPr>
+          <a:xfrm>
+            <a:off x="6065203" y="3665220"/>
+            <a:ext cx="1098958" cy="1467623"/>
+            <a:chOff x="5546521" y="962637"/>
+            <a:chExt cx="1098958" cy="1619075"/>
+          </a:xfrm>
+        </p:grpSpPr>
+        <p:pic>
+          <p:nvPicPr>
+            <p:cNvPr id="3" name="图片 2">
+              <a:extLst>
+                <a:ext uri="{FF2B5EF4-FFF2-40B4-BE49-F238E27FC236}">
+                  <a16:creationId xmlns:a16="http://schemas.microsoft.com/office/drawing/2014/main" id="{7FF24FA6-02FC-4BF6-9CA6-9F2684530128}"/>
+                </a:ext>
+              </a:extLst>
+            </p:cNvPr>
+            <p:cNvPicPr>
+              <a:picLocks noChangeAspect="1"/>
+            </p:cNvPicPr>
+            <p:nvPr/>
+          </p:nvPicPr>
+          <p:blipFill rotWithShape="1">
+            <a:blip r:embed="rId2" cstate="print">
+              <a:extLst>
+                <a:ext uri="{28A0092B-C50C-407E-A947-70E740481C1C}">
+                  <a14:useLocalDpi xmlns:a14="http://schemas.microsoft.com/office/drawing/2010/main" val="0"/>
+                </a:ext>
+              </a:extLst>
+            </a:blip>
+            <a:srcRect l="33601" t="41223" r="43706" b="35168"/>
+            <a:stretch/>
+          </p:blipFill>
+          <p:spPr>
+            <a:xfrm>
+              <a:off x="5546521" y="962637"/>
+              <a:ext cx="1098958" cy="1619075"/>
+            </a:xfrm>
+            <a:prstGeom prst="rect">
+              <a:avLst/>
+            </a:prstGeom>
+            <a:ln w="6350" cap="sq">
+              <a:solidFill>
+                <a:srgbClr val="000000"/>
+              </a:solidFill>
+              <a:prstDash val="solid"/>
+              <a:miter lim="800000"/>
+            </a:ln>
+            <a:effectLst>
+              <a:outerShdw blurRad="50800" dist="38100" dir="2700000" algn="tl" rotWithShape="0">
+                <a:srgbClr val="000000">
+                  <a:alpha val="43000"/>
+                </a:srgbClr>
+              </a:outerShdw>
+            </a:effectLst>
+          </p:spPr>
+        </p:pic>
+        <p:sp>
+          <p:nvSpPr>
+            <p:cNvPr id="16" name="文本框 15">
+              <a:extLst>
+                <a:ext uri="{FF2B5EF4-FFF2-40B4-BE49-F238E27FC236}">
+                  <a16:creationId xmlns:a16="http://schemas.microsoft.com/office/drawing/2014/main" id="{AB4F5715-82BB-4DCF-B59F-4FCCD142B838}"/>
+                </a:ext>
+              </a:extLst>
+            </p:cNvPr>
+            <p:cNvSpPr txBox="1"/>
+            <p:nvPr/>
+          </p:nvSpPr>
+          <p:spPr>
+            <a:xfrm>
+              <a:off x="5558605" y="2138328"/>
+              <a:ext cx="860684" cy="441400"/>
+            </a:xfrm>
+            <a:prstGeom prst="rect">
+              <a:avLst/>
+            </a:prstGeom>
+            <a:noFill/>
+          </p:spPr>
+          <p:txBody>
+            <a:bodyPr wrap="square" rtlCol="0">
+              <a:spAutoFit/>
+            </a:bodyPr>
+            <a:lstStyle/>
+            <a:p>
+              <a:r>
+                <a:rPr lang="en-US" altLang="zh-CN" sz="1000" dirty="0">
+                  <a:latin typeface="Arial" panose="020B0604020202020204" pitchFamily="34" charset="0"/>
+                  <a:cs typeface="Arial" panose="020B0604020202020204" pitchFamily="34" charset="0"/>
+                </a:rPr>
+                <a:t>Mackay Whitsunday</a:t>
+              </a:r>
+              <a:endParaRPr lang="zh-CN" altLang="en-US" sz="1000" dirty="0">
+                <a:latin typeface="Arial" panose="020B0604020202020204" pitchFamily="34" charset="0"/>
+                <a:cs typeface="Arial" panose="020B0604020202020204" pitchFamily="34" charset="0"/>
+              </a:endParaRPr>
+            </a:p>
+          </p:txBody>
+        </p:sp>
+      </p:grpSp>
+      <p:grpSp>
+        <p:nvGrpSpPr>
+          <p:cNvPr id="49" name="组合 48">
+            <a:extLst>
+              <a:ext uri="{FF2B5EF4-FFF2-40B4-BE49-F238E27FC236}">
+                <a16:creationId xmlns:a16="http://schemas.microsoft.com/office/drawing/2014/main" id="{EDDF3036-65C2-427D-B645-163807D421F5}"/>
+              </a:ext>
+            </a:extLst>
+          </p:cNvPr>
+          <p:cNvGrpSpPr/>
+          <p:nvPr/>
+        </p:nvGrpSpPr>
+        <p:grpSpPr>
+          <a:xfrm>
+            <a:off x="6022682" y="1960596"/>
+            <a:ext cx="1333599" cy="1543515"/>
+            <a:chOff x="6137629" y="723435"/>
+            <a:chExt cx="1486419" cy="1696920"/>
+          </a:xfrm>
+        </p:grpSpPr>
+        <p:pic>
+          <p:nvPicPr>
+            <p:cNvPr id="35" name="图片 34">
+              <a:extLst>
+                <a:ext uri="{FF2B5EF4-FFF2-40B4-BE49-F238E27FC236}">
+                  <a16:creationId xmlns:a16="http://schemas.microsoft.com/office/drawing/2014/main" id="{9DB24E35-FE28-44D5-BADA-85D851607CCF}"/>
+                </a:ext>
+              </a:extLst>
+            </p:cNvPr>
+            <p:cNvPicPr>
+              <a:picLocks noChangeAspect="1"/>
+            </p:cNvPicPr>
+            <p:nvPr/>
+          </p:nvPicPr>
+          <p:blipFill rotWithShape="1">
+            <a:blip r:embed="rId3" cstate="print">
+              <a:extLst>
+                <a:ext uri="{28A0092B-C50C-407E-A947-70E740481C1C}">
+                  <a14:useLocalDpi xmlns:a14="http://schemas.microsoft.com/office/drawing/2010/main" val="0"/>
+                </a:ext>
+              </a:extLst>
+            </a:blip>
+            <a:srcRect l="32377" t="30000" r="21047" b="31666"/>
+            <a:stretch/>
+          </p:blipFill>
+          <p:spPr>
+            <a:xfrm>
+              <a:off x="6168152" y="723435"/>
+              <a:ext cx="1455896" cy="1696920"/>
+            </a:xfrm>
+            <a:prstGeom prst="rect">
+              <a:avLst/>
+            </a:prstGeom>
+          </p:spPr>
+        </p:pic>
+        <p:sp>
+          <p:nvSpPr>
+            <p:cNvPr id="37" name="文本框 36">
+              <a:extLst>
+                <a:ext uri="{FF2B5EF4-FFF2-40B4-BE49-F238E27FC236}">
+                  <a16:creationId xmlns:a16="http://schemas.microsoft.com/office/drawing/2014/main" id="{A538FDC0-85C5-499D-8209-131D5EE26BCD}"/>
+                </a:ext>
+              </a:extLst>
+            </p:cNvPr>
+            <p:cNvSpPr txBox="1"/>
+            <p:nvPr/>
+          </p:nvSpPr>
+          <p:spPr>
+            <a:xfrm>
+              <a:off x="6137629" y="1490096"/>
+              <a:ext cx="1002926" cy="270692"/>
+            </a:xfrm>
+            <a:prstGeom prst="rect">
+              <a:avLst/>
+            </a:prstGeom>
+            <a:noFill/>
+          </p:spPr>
+          <p:txBody>
+            <a:bodyPr wrap="square" rtlCol="0">
+              <a:spAutoFit/>
+            </a:bodyPr>
+            <a:lstStyle/>
+            <a:p>
+              <a:r>
+                <a:rPr lang="en-US" altLang="zh-CN" sz="1000" dirty="0">
+                  <a:latin typeface="Arial" panose="020B0604020202020204" pitchFamily="34" charset="0"/>
+                  <a:cs typeface="Arial" panose="020B0604020202020204" pitchFamily="34" charset="0"/>
+                </a:rPr>
+                <a:t>Queensland</a:t>
+              </a:r>
+              <a:endParaRPr lang="zh-CN" altLang="en-US" sz="1000" dirty="0">
+                <a:latin typeface="Arial" panose="020B0604020202020204" pitchFamily="34" charset="0"/>
+                <a:cs typeface="Arial" panose="020B0604020202020204" pitchFamily="34" charset="0"/>
+              </a:endParaRPr>
+            </a:p>
+          </p:txBody>
+        </p:sp>
+      </p:grpSp>
+      <p:cxnSp>
+        <p:nvCxnSpPr>
+          <p:cNvPr id="11" name="直接连接符 10">
+            <a:extLst>
+              <a:ext uri="{FF2B5EF4-FFF2-40B4-BE49-F238E27FC236}">
+                <a16:creationId xmlns:a16="http://schemas.microsoft.com/office/drawing/2014/main" id="{3DC5AF13-4604-48BF-96B2-3A1CFC30C20C}"/>
+              </a:ext>
+            </a:extLst>
+          </p:cNvPr>
+          <p:cNvCxnSpPr>
+            <a:cxnSpLocks/>
+          </p:cNvCxnSpPr>
+          <p:nvPr/>
+        </p:nvCxnSpPr>
+        <p:spPr>
+          <a:xfrm flipV="1">
+            <a:off x="6065203" y="2732353"/>
+            <a:ext cx="830717" cy="931068"/>
+          </a:xfrm>
+          <a:prstGeom prst="line">
+            <a:avLst/>
+          </a:prstGeom>
+          <a:ln>
+            <a:solidFill>
+              <a:schemeClr val="bg1">
+                <a:lumMod val="50000"/>
+              </a:schemeClr>
+            </a:solidFill>
+            <a:prstDash val="lgDashDot"/>
+          </a:ln>
+        </p:spPr>
+        <p:style>
+          <a:lnRef idx="1">
+            <a:schemeClr val="dk1"/>
+          </a:lnRef>
+          <a:fillRef idx="0">
+            <a:schemeClr val="dk1"/>
+          </a:fillRef>
+          <a:effectRef idx="0">
+            <a:schemeClr val="dk1"/>
+          </a:effectRef>
+          <a:fontRef idx="minor">
+            <a:schemeClr val="tx1"/>
+          </a:fontRef>
+        </p:style>
+      </p:cxnSp>
+      <p:cxnSp>
+        <p:nvCxnSpPr>
+          <p:cNvPr id="13" name="直接连接符 12">
+            <a:extLst>
+              <a:ext uri="{FF2B5EF4-FFF2-40B4-BE49-F238E27FC236}">
+                <a16:creationId xmlns:a16="http://schemas.microsoft.com/office/drawing/2014/main" id="{65BBB974-E86C-4CC0-954B-929C2ECA6370}"/>
+              </a:ext>
+            </a:extLst>
+          </p:cNvPr>
+          <p:cNvCxnSpPr>
+            <a:cxnSpLocks/>
+          </p:cNvCxnSpPr>
+          <p:nvPr/>
+        </p:nvCxnSpPr>
+        <p:spPr>
+          <a:xfrm>
+            <a:off x="7012430" y="2925445"/>
+            <a:ext cx="154906" cy="736600"/>
+          </a:xfrm>
+          <a:prstGeom prst="line">
+            <a:avLst/>
+          </a:prstGeom>
+          <a:ln>
+            <a:solidFill>
+              <a:schemeClr val="bg1">
+                <a:lumMod val="50000"/>
+              </a:schemeClr>
+            </a:solidFill>
+            <a:prstDash val="lgDashDot"/>
+          </a:ln>
+        </p:spPr>
+        <p:style>
+          <a:lnRef idx="1">
+            <a:schemeClr val="dk1"/>
+          </a:lnRef>
+          <a:fillRef idx="0">
+            <a:schemeClr val="dk1"/>
+          </a:fillRef>
+          <a:effectRef idx="0">
+            <a:schemeClr val="dk1"/>
+          </a:effectRef>
+          <a:fontRef idx="minor">
+            <a:schemeClr val="tx1"/>
+          </a:fontRef>
+        </p:style>
+      </p:cxnSp>
+      <p:sp>
+        <p:nvSpPr>
+          <p:cNvPr id="75" name="矩形 74">
+            <a:extLst>
+              <a:ext uri="{FF2B5EF4-FFF2-40B4-BE49-F238E27FC236}">
+                <a16:creationId xmlns:a16="http://schemas.microsoft.com/office/drawing/2014/main" id="{25A8C9AB-8A67-49D9-8A91-B4A7003B0EC3}"/>
+              </a:ext>
+            </a:extLst>
+          </p:cNvPr>
+          <p:cNvSpPr/>
+          <p:nvPr/>
+        </p:nvSpPr>
+        <p:spPr>
+          <a:xfrm>
+            <a:off x="3401482" y="1744980"/>
+            <a:ext cx="3954799" cy="3680460"/>
+          </a:xfrm>
+          <a:prstGeom prst="rect">
+            <a:avLst/>
+          </a:prstGeom>
+          <a:noFill/>
+          <a:ln>
+            <a:solidFill>
+              <a:schemeClr val="bg2">
+                <a:lumMod val="25000"/>
+              </a:schemeClr>
+            </a:solidFill>
+          </a:ln>
+        </p:spPr>
+        <p:style>
+          <a:lnRef idx="2">
+            <a:schemeClr val="accent1">
+              <a:shade val="50000"/>
+            </a:schemeClr>
+          </a:lnRef>
+          <a:fillRef idx="1">
+            <a:schemeClr val="accent1"/>
+          </a:fillRef>
+          <a:effectRef idx="0">
+            <a:schemeClr val="accent1"/>
+          </a:effectRef>
+          <a:fontRef idx="minor">
+            <a:schemeClr val="lt1"/>
+          </a:fontRef>
+        </p:style>
+        <p:txBody>
+          <a:bodyPr rtlCol="0" anchor="ctr"/>
+          <a:lstStyle/>
+          <a:p>
+            <a:pPr algn="ctr"/>
+            <a:endParaRPr lang="zh-CN" altLang="en-US"/>
+          </a:p>
+        </p:txBody>
+      </p:sp>
+      <p:pic>
+        <p:nvPicPr>
+          <p:cNvPr id="77" name="图片 76">
+            <a:extLst>
+              <a:ext uri="{FF2B5EF4-FFF2-40B4-BE49-F238E27FC236}">
+                <a16:creationId xmlns:a16="http://schemas.microsoft.com/office/drawing/2014/main" id="{19A6CDD8-05F7-446B-BED0-C72461C51E9D}"/>
+              </a:ext>
+            </a:extLst>
+          </p:cNvPr>
+          <p:cNvPicPr>
+            <a:picLocks noChangeAspect="1"/>
+          </p:cNvPicPr>
+          <p:nvPr/>
+        </p:nvPicPr>
+        <p:blipFill rotWithShape="1">
+          <a:blip r:embed="rId4" cstate="print">
+            <a:extLst>
+              <a:ext uri="{28A0092B-C50C-407E-A947-70E740481C1C}">
+                <a14:useLocalDpi xmlns:a14="http://schemas.microsoft.com/office/drawing/2010/main" val="0"/>
+              </a:ext>
+            </a:extLst>
+          </a:blip>
+          <a:srcRect l="28443" t="26556" r="19316" b="24889"/>
+          <a:stretch/>
+        </p:blipFill>
+        <p:spPr>
+          <a:xfrm>
+            <a:off x="3434587" y="1862001"/>
+            <a:ext cx="2529840" cy="3329940"/>
+          </a:xfrm>
+          <a:prstGeom prst="rect">
+            <a:avLst/>
+          </a:prstGeom>
+        </p:spPr>
+      </p:pic>
+      <p:cxnSp>
+        <p:nvCxnSpPr>
+          <p:cNvPr id="42" name="直接连接符 41">
+            <a:extLst>
+              <a:ext uri="{FF2B5EF4-FFF2-40B4-BE49-F238E27FC236}">
+                <a16:creationId xmlns:a16="http://schemas.microsoft.com/office/drawing/2014/main" id="{640A820C-7239-4EAC-85D5-003C6598E48C}"/>
+              </a:ext>
+            </a:extLst>
+          </p:cNvPr>
+          <p:cNvCxnSpPr>
+            <a:cxnSpLocks/>
+          </p:cNvCxnSpPr>
+          <p:nvPr/>
+        </p:nvCxnSpPr>
+        <p:spPr>
+          <a:xfrm flipH="1" flipV="1">
+            <a:off x="5608320" y="3824530"/>
+            <a:ext cx="701040" cy="374700"/>
+          </a:xfrm>
+          <a:prstGeom prst="line">
+            <a:avLst/>
+          </a:prstGeom>
+          <a:ln w="9525" cap="flat" cmpd="sng" algn="ctr">
+            <a:solidFill>
+              <a:schemeClr val="dk1"/>
+            </a:solidFill>
+            <a:prstDash val="solid"/>
+            <a:round/>
+            <a:headEnd type="none" w="med" len="med"/>
+            <a:tailEnd type="arrow" w="med" len="med"/>
+          </a:ln>
+        </p:spPr>
+        <p:style>
+          <a:lnRef idx="0">
+            <a:scrgbClr r="0" g="0" b="0"/>
+          </a:lnRef>
+          <a:fillRef idx="0">
+            <a:scrgbClr r="0" g="0" b="0"/>
+          </a:fillRef>
+          <a:effectRef idx="0">
+            <a:scrgbClr r="0" g="0" b="0"/>
+          </a:effectRef>
+          <a:fontRef idx="minor">
+            <a:schemeClr val="tx1"/>
+          </a:fontRef>
+        </p:style>
+      </p:cxnSp>
+    </p:spTree>
+    <p:extLst>
+      <p:ext uri="{BB962C8B-B14F-4D97-AF65-F5344CB8AC3E}">
+        <p14:creationId xmlns:p14="http://schemas.microsoft.com/office/powerpoint/2010/main" val="2836170125"/>
+      </p:ext>
+    </p:extLst>
+  </p:cSld>
+  <p:clrMapOvr>
+    <a:masterClrMapping/>
+  </p:clrMapOvr>
+</p:sld>
+</file>
+
 <file path=ppt/theme/theme1.xml><?xml version="1.0" encoding="utf-8"?>
 <a:theme xmlns:a="http://schemas.openxmlformats.org/drawingml/2006/main" name="Office 主题">
   <a:themeElements>

</xml_diff>

<commit_message>
New results: the figure for comparing FF practice
</commit_message>
<xml_diff>
--- a/output/paper0915/figure/Figures.pptx
+++ b/output/paper0915/figure/Figures.pptx
@@ -247,7 +247,7 @@
           <a:p>
             <a:fld id="{35C5FA2C-692F-48D1-A2F8-67B0244C0896}" type="datetimeFigureOut">
               <a:rPr lang="zh-CN" altLang="en-US" smtClean="0"/>
-              <a:t>2020/12/14</a:t>
+              <a:t>2020/12/22</a:t>
             </a:fld>
             <a:endParaRPr lang="zh-CN" altLang="en-US"/>
           </a:p>
@@ -415,7 +415,7 @@
           <a:p>
             <a:fld id="{35C5FA2C-692F-48D1-A2F8-67B0244C0896}" type="datetimeFigureOut">
               <a:rPr lang="zh-CN" altLang="en-US" smtClean="0"/>
-              <a:t>2020/12/14</a:t>
+              <a:t>2020/12/22</a:t>
             </a:fld>
             <a:endParaRPr lang="zh-CN" altLang="en-US"/>
           </a:p>
@@ -593,7 +593,7 @@
           <a:p>
             <a:fld id="{35C5FA2C-692F-48D1-A2F8-67B0244C0896}" type="datetimeFigureOut">
               <a:rPr lang="zh-CN" altLang="en-US" smtClean="0"/>
-              <a:t>2020/12/14</a:t>
+              <a:t>2020/12/22</a:t>
             </a:fld>
             <a:endParaRPr lang="zh-CN" altLang="en-US"/>
           </a:p>
@@ -761,7 +761,7 @@
           <a:p>
             <a:fld id="{35C5FA2C-692F-48D1-A2F8-67B0244C0896}" type="datetimeFigureOut">
               <a:rPr lang="zh-CN" altLang="en-US" smtClean="0"/>
-              <a:t>2020/12/14</a:t>
+              <a:t>2020/12/22</a:t>
             </a:fld>
             <a:endParaRPr lang="zh-CN" altLang="en-US"/>
           </a:p>
@@ -1006,7 +1006,7 @@
           <a:p>
             <a:fld id="{35C5FA2C-692F-48D1-A2F8-67B0244C0896}" type="datetimeFigureOut">
               <a:rPr lang="zh-CN" altLang="en-US" smtClean="0"/>
-              <a:t>2020/12/14</a:t>
+              <a:t>2020/12/22</a:t>
             </a:fld>
             <a:endParaRPr lang="zh-CN" altLang="en-US"/>
           </a:p>
@@ -1235,7 +1235,7 @@
           <a:p>
             <a:fld id="{35C5FA2C-692F-48D1-A2F8-67B0244C0896}" type="datetimeFigureOut">
               <a:rPr lang="zh-CN" altLang="en-US" smtClean="0"/>
-              <a:t>2020/12/14</a:t>
+              <a:t>2020/12/22</a:t>
             </a:fld>
             <a:endParaRPr lang="zh-CN" altLang="en-US"/>
           </a:p>
@@ -1599,7 +1599,7 @@
           <a:p>
             <a:fld id="{35C5FA2C-692F-48D1-A2F8-67B0244C0896}" type="datetimeFigureOut">
               <a:rPr lang="zh-CN" altLang="en-US" smtClean="0"/>
-              <a:t>2020/12/14</a:t>
+              <a:t>2020/12/22</a:t>
             </a:fld>
             <a:endParaRPr lang="zh-CN" altLang="en-US"/>
           </a:p>
@@ -1716,7 +1716,7 @@
           <a:p>
             <a:fld id="{35C5FA2C-692F-48D1-A2F8-67B0244C0896}" type="datetimeFigureOut">
               <a:rPr lang="zh-CN" altLang="en-US" smtClean="0"/>
-              <a:t>2020/12/14</a:t>
+              <a:t>2020/12/22</a:t>
             </a:fld>
             <a:endParaRPr lang="zh-CN" altLang="en-US"/>
           </a:p>
@@ -1811,7 +1811,7 @@
           <a:p>
             <a:fld id="{35C5FA2C-692F-48D1-A2F8-67B0244C0896}" type="datetimeFigureOut">
               <a:rPr lang="zh-CN" altLang="en-US" smtClean="0"/>
-              <a:t>2020/12/14</a:t>
+              <a:t>2020/12/22</a:t>
             </a:fld>
             <a:endParaRPr lang="zh-CN" altLang="en-US"/>
           </a:p>
@@ -2086,7 +2086,7 @@
           <a:p>
             <a:fld id="{35C5FA2C-692F-48D1-A2F8-67B0244C0896}" type="datetimeFigureOut">
               <a:rPr lang="zh-CN" altLang="en-US" smtClean="0"/>
-              <a:t>2020/12/14</a:t>
+              <a:t>2020/12/22</a:t>
             </a:fld>
             <a:endParaRPr lang="zh-CN" altLang="en-US"/>
           </a:p>
@@ -2338,7 +2338,7 @@
           <a:p>
             <a:fld id="{35C5FA2C-692F-48D1-A2F8-67B0244C0896}" type="datetimeFigureOut">
               <a:rPr lang="zh-CN" altLang="en-US" smtClean="0"/>
-              <a:t>2020/12/14</a:t>
+              <a:t>2020/12/22</a:t>
             </a:fld>
             <a:endParaRPr lang="zh-CN" altLang="en-US"/>
           </a:p>
@@ -2549,7 +2549,7 @@
           <a:p>
             <a:fld id="{35C5FA2C-692F-48D1-A2F8-67B0244C0896}" type="datetimeFigureOut">
               <a:rPr lang="zh-CN" altLang="en-US" smtClean="0"/>
-              <a:t>2020/12/14</a:t>
+              <a:t>2020/12/22</a:t>
             </a:fld>
             <a:endParaRPr lang="zh-CN" altLang="en-US"/>
           </a:p>
@@ -9128,10 +9128,10 @@
       </p:grpSpPr>
       <p:pic>
         <p:nvPicPr>
-          <p:cNvPr id="8" name="图片 7">
+          <p:cNvPr id="3" name="图片 2">
             <a:extLst>
               <a:ext uri="{FF2B5EF4-FFF2-40B4-BE49-F238E27FC236}">
-                <a16:creationId xmlns:a16="http://schemas.microsoft.com/office/drawing/2014/main" id="{8ADE2E22-7C9C-440F-9FED-1C70018C50E5}"/>
+                <a16:creationId xmlns:a16="http://schemas.microsoft.com/office/drawing/2014/main" id="{8F25978C-8657-4DF5-9B17-E00BCE8350FC}"/>
               </a:ext>
             </a:extLst>
           </p:cNvPr>
@@ -9154,8 +9154,8 @@
         </p:blipFill>
         <p:spPr>
           <a:xfrm>
-            <a:off x="3440674" y="1493258"/>
-            <a:ext cx="5310652" cy="5012386"/>
+            <a:off x="3465638" y="1447151"/>
+            <a:ext cx="5395291" cy="5096262"/>
           </a:xfrm>
           <a:prstGeom prst="rect">
             <a:avLst/>
@@ -9229,13 +9229,13 @@
           <p:nvPr>
             <p:extLst>
               <p:ext uri="{D42A27DB-BD31-4B8C-83A1-F6EECF244321}">
-                <p14:modId xmlns:p14="http://schemas.microsoft.com/office/powerpoint/2010/main" val="1880873614"/>
+                <p14:modId xmlns:p14="http://schemas.microsoft.com/office/powerpoint/2010/main" val="4176443668"/>
               </p:ext>
             </p:extLst>
           </p:nvPr>
         </p:nvGraphicFramePr>
         <p:xfrm>
-          <a:off x="8726363" y="2114025"/>
+          <a:off x="9623985" y="2072080"/>
           <a:ext cx="1709746" cy="2892244"/>
         </p:xfrm>
         <a:graphic>
@@ -9474,6 +9474,41 @@
           <a:chExt cx="0" cy="0"/>
         </a:xfrm>
       </p:grpSpPr>
+      <p:pic>
+        <p:nvPicPr>
+          <p:cNvPr id="4" name="图片 3">
+            <a:extLst>
+              <a:ext uri="{FF2B5EF4-FFF2-40B4-BE49-F238E27FC236}">
+                <a16:creationId xmlns:a16="http://schemas.microsoft.com/office/drawing/2014/main" id="{0CC67A13-4353-4C33-A755-7653D597E5C9}"/>
+              </a:ext>
+            </a:extLst>
+          </p:cNvPr>
+          <p:cNvPicPr>
+            <a:picLocks noChangeAspect="1"/>
+          </p:cNvPicPr>
+          <p:nvPr/>
+        </p:nvPicPr>
+        <p:blipFill rotWithShape="1">
+          <a:blip r:embed="rId2" cstate="print">
+            <a:extLst>
+              <a:ext uri="{28A0092B-C50C-407E-A947-70E740481C1C}">
+                <a14:useLocalDpi xmlns:a14="http://schemas.microsoft.com/office/drawing/2010/main" val="0"/>
+              </a:ext>
+            </a:extLst>
+          </a:blip>
+          <a:srcRect l="29072" t="27151" r="19788" b="25181"/>
+          <a:stretch/>
+        </p:blipFill>
+        <p:spPr>
+          <a:xfrm>
+            <a:off x="3493651" y="1936391"/>
+            <a:ext cx="2498161" cy="3297637"/>
+          </a:xfrm>
+          <a:prstGeom prst="rect">
+            <a:avLst/>
+          </a:prstGeom>
+        </p:spPr>
+      </p:pic>
       <p:grpSp>
         <p:nvGrpSpPr>
           <p:cNvPr id="15" name="组合 14">
@@ -9509,7 +9544,7 @@
             <p:nvPr/>
           </p:nvPicPr>
           <p:blipFill rotWithShape="1">
-            <a:blip r:embed="rId2" cstate="print">
+            <a:blip r:embed="rId3" cstate="print">
               <a:extLst>
                 <a:ext uri="{28A0092B-C50C-407E-A947-70E740481C1C}">
                   <a14:useLocalDpi xmlns:a14="http://schemas.microsoft.com/office/drawing/2010/main" val="0"/>
@@ -9621,7 +9656,7 @@
             <p:nvPr/>
           </p:nvPicPr>
           <p:blipFill rotWithShape="1">
-            <a:blip r:embed="rId3" cstate="print">
+            <a:blip r:embed="rId4" cstate="print">
               <a:extLst>
                 <a:ext uri="{28A0092B-C50C-407E-A947-70E740481C1C}">
                   <a14:useLocalDpi xmlns:a14="http://schemas.microsoft.com/office/drawing/2010/main" val="0"/>
@@ -9830,41 +9865,6 @@
           </a:p>
         </p:txBody>
       </p:sp>
-      <p:pic>
-        <p:nvPicPr>
-          <p:cNvPr id="77" name="图片 76">
-            <a:extLst>
-              <a:ext uri="{FF2B5EF4-FFF2-40B4-BE49-F238E27FC236}">
-                <a16:creationId xmlns:a16="http://schemas.microsoft.com/office/drawing/2014/main" id="{19A6CDD8-05F7-446B-BED0-C72461C51E9D}"/>
-              </a:ext>
-            </a:extLst>
-          </p:cNvPr>
-          <p:cNvPicPr>
-            <a:picLocks noChangeAspect="1"/>
-          </p:cNvPicPr>
-          <p:nvPr/>
-        </p:nvPicPr>
-        <p:blipFill rotWithShape="1">
-          <a:blip r:embed="rId4" cstate="print">
-            <a:extLst>
-              <a:ext uri="{28A0092B-C50C-407E-A947-70E740481C1C}">
-                <a14:useLocalDpi xmlns:a14="http://schemas.microsoft.com/office/drawing/2010/main" val="0"/>
-              </a:ext>
-            </a:extLst>
-          </a:blip>
-          <a:srcRect l="28443" t="26556" r="19316" b="24889"/>
-          <a:stretch/>
-        </p:blipFill>
-        <p:spPr>
-          <a:xfrm>
-            <a:off x="3434587" y="1862001"/>
-            <a:ext cx="2529840" cy="3329940"/>
-          </a:xfrm>
-          <a:prstGeom prst="rect">
-            <a:avLst/>
-          </a:prstGeom>
-        </p:spPr>
-      </p:pic>
       <p:cxnSp>
         <p:nvCxnSpPr>
           <p:cNvPr id="42" name="直接连接符 41">

</xml_diff>

<commit_message>
Change the ticklables in Figure 10
Replace "True values" with “Unconditional values”
</commit_message>
<xml_diff>
--- a/output/paper0915/figure/Figures.pptx
+++ b/output/paper0915/figure/Figures.pptx
@@ -5,13 +5,13 @@
     <p:sldMasterId id="2147483648" r:id="rId1"/>
   </p:sldMasterIdLst>
   <p:sldIdLst>
-    <p:sldId id="261" r:id="rId2"/>
-    <p:sldId id="260" r:id="rId3"/>
-    <p:sldId id="263" r:id="rId4"/>
-    <p:sldId id="256" r:id="rId5"/>
-    <p:sldId id="259" r:id="rId6"/>
-    <p:sldId id="262" r:id="rId7"/>
-    <p:sldId id="264" r:id="rId8"/>
+    <p:sldId id="260" r:id="rId2"/>
+    <p:sldId id="264" r:id="rId3"/>
+    <p:sldId id="261" r:id="rId4"/>
+    <p:sldId id="263" r:id="rId5"/>
+    <p:sldId id="256" r:id="rId6"/>
+    <p:sldId id="259" r:id="rId7"/>
+    <p:sldId id="262" r:id="rId8"/>
   </p:sldIdLst>
   <p:sldSz cx="12192000" cy="6858000"/>
   <p:notesSz cx="6858000" cy="9144000"/>
@@ -247,7 +247,7 @@
           <a:p>
             <a:fld id="{35C5FA2C-692F-48D1-A2F8-67B0244C0896}" type="datetimeFigureOut">
               <a:rPr lang="zh-CN" altLang="en-US" smtClean="0"/>
-              <a:t>2020/12/22</a:t>
+              <a:t>2020/12/30</a:t>
             </a:fld>
             <a:endParaRPr lang="zh-CN" altLang="en-US"/>
           </a:p>
@@ -415,7 +415,7 @@
           <a:p>
             <a:fld id="{35C5FA2C-692F-48D1-A2F8-67B0244C0896}" type="datetimeFigureOut">
               <a:rPr lang="zh-CN" altLang="en-US" smtClean="0"/>
-              <a:t>2020/12/22</a:t>
+              <a:t>2020/12/30</a:t>
             </a:fld>
             <a:endParaRPr lang="zh-CN" altLang="en-US"/>
           </a:p>
@@ -593,7 +593,7 @@
           <a:p>
             <a:fld id="{35C5FA2C-692F-48D1-A2F8-67B0244C0896}" type="datetimeFigureOut">
               <a:rPr lang="zh-CN" altLang="en-US" smtClean="0"/>
-              <a:t>2020/12/22</a:t>
+              <a:t>2020/12/30</a:t>
             </a:fld>
             <a:endParaRPr lang="zh-CN" altLang="en-US"/>
           </a:p>
@@ -761,7 +761,7 @@
           <a:p>
             <a:fld id="{35C5FA2C-692F-48D1-A2F8-67B0244C0896}" type="datetimeFigureOut">
               <a:rPr lang="zh-CN" altLang="en-US" smtClean="0"/>
-              <a:t>2020/12/22</a:t>
+              <a:t>2020/12/30</a:t>
             </a:fld>
             <a:endParaRPr lang="zh-CN" altLang="en-US"/>
           </a:p>
@@ -1006,7 +1006,7 @@
           <a:p>
             <a:fld id="{35C5FA2C-692F-48D1-A2F8-67B0244C0896}" type="datetimeFigureOut">
               <a:rPr lang="zh-CN" altLang="en-US" smtClean="0"/>
-              <a:t>2020/12/22</a:t>
+              <a:t>2020/12/30</a:t>
             </a:fld>
             <a:endParaRPr lang="zh-CN" altLang="en-US"/>
           </a:p>
@@ -1235,7 +1235,7 @@
           <a:p>
             <a:fld id="{35C5FA2C-692F-48D1-A2F8-67B0244C0896}" type="datetimeFigureOut">
               <a:rPr lang="zh-CN" altLang="en-US" smtClean="0"/>
-              <a:t>2020/12/22</a:t>
+              <a:t>2020/12/30</a:t>
             </a:fld>
             <a:endParaRPr lang="zh-CN" altLang="en-US"/>
           </a:p>
@@ -1599,7 +1599,7 @@
           <a:p>
             <a:fld id="{35C5FA2C-692F-48D1-A2F8-67B0244C0896}" type="datetimeFigureOut">
               <a:rPr lang="zh-CN" altLang="en-US" smtClean="0"/>
-              <a:t>2020/12/22</a:t>
+              <a:t>2020/12/30</a:t>
             </a:fld>
             <a:endParaRPr lang="zh-CN" altLang="en-US"/>
           </a:p>
@@ -1716,7 +1716,7 @@
           <a:p>
             <a:fld id="{35C5FA2C-692F-48D1-A2F8-67B0244C0896}" type="datetimeFigureOut">
               <a:rPr lang="zh-CN" altLang="en-US" smtClean="0"/>
-              <a:t>2020/12/22</a:t>
+              <a:t>2020/12/30</a:t>
             </a:fld>
             <a:endParaRPr lang="zh-CN" altLang="en-US"/>
           </a:p>
@@ -1811,7 +1811,7 @@
           <a:p>
             <a:fld id="{35C5FA2C-692F-48D1-A2F8-67B0244C0896}" type="datetimeFigureOut">
               <a:rPr lang="zh-CN" altLang="en-US" smtClean="0"/>
-              <a:t>2020/12/22</a:t>
+              <a:t>2020/12/30</a:t>
             </a:fld>
             <a:endParaRPr lang="zh-CN" altLang="en-US"/>
           </a:p>
@@ -2086,7 +2086,7 @@
           <a:p>
             <a:fld id="{35C5FA2C-692F-48D1-A2F8-67B0244C0896}" type="datetimeFigureOut">
               <a:rPr lang="zh-CN" altLang="en-US" smtClean="0"/>
-              <a:t>2020/12/22</a:t>
+              <a:t>2020/12/30</a:t>
             </a:fld>
             <a:endParaRPr lang="zh-CN" altLang="en-US"/>
           </a:p>
@@ -2338,7 +2338,7 @@
           <a:p>
             <a:fld id="{35C5FA2C-692F-48D1-A2F8-67B0244C0896}" type="datetimeFigureOut">
               <a:rPr lang="zh-CN" altLang="en-US" smtClean="0"/>
-              <a:t>2020/12/22</a:t>
+              <a:t>2020/12/30</a:t>
             </a:fld>
             <a:endParaRPr lang="zh-CN" altLang="en-US"/>
           </a:p>
@@ -2549,7 +2549,7 @@
           <a:p>
             <a:fld id="{35C5FA2C-692F-48D1-A2F8-67B0244C0896}" type="datetimeFigureOut">
               <a:rPr lang="zh-CN" altLang="en-US" smtClean="0"/>
-              <a:t>2020/12/22</a:t>
+              <a:t>2020/12/30</a:t>
             </a:fld>
             <a:endParaRPr lang="zh-CN" altLang="en-US"/>
           </a:p>
@@ -2956,1197 +2956,6 @@
       </p:grpSpPr>
       <p:sp>
         <p:nvSpPr>
-          <p:cNvPr id="2" name="圆角矩形 1"/>
-          <p:cNvSpPr/>
-          <p:nvPr/>
-        </p:nvSpPr>
-        <p:spPr>
-          <a:xfrm>
-            <a:off x="3469715" y="224444"/>
-            <a:ext cx="4142738" cy="6384175"/>
-          </a:xfrm>
-          <a:prstGeom prst="roundRect">
-            <a:avLst/>
-          </a:prstGeom>
-          <a:solidFill>
-            <a:schemeClr val="accent2">
-              <a:lumMod val="20000"/>
-              <a:lumOff val="80000"/>
-            </a:schemeClr>
-          </a:solidFill>
-          <a:ln>
-            <a:noFill/>
-          </a:ln>
-        </p:spPr>
-        <p:style>
-          <a:lnRef idx="2">
-            <a:schemeClr val="accent1">
-              <a:shade val="50000"/>
-            </a:schemeClr>
-          </a:lnRef>
-          <a:fillRef idx="1">
-            <a:schemeClr val="accent1"/>
-          </a:fillRef>
-          <a:effectRef idx="0">
-            <a:schemeClr val="accent1"/>
-          </a:effectRef>
-          <a:fontRef idx="minor">
-            <a:schemeClr val="lt1"/>
-          </a:fontRef>
-        </p:style>
-        <p:txBody>
-          <a:bodyPr rtlCol="0" anchor="ctr"/>
-          <a:lstStyle/>
-          <a:p>
-            <a:pPr algn="ctr"/>
-            <a:endParaRPr lang="zh-CN" altLang="en-US"/>
-          </a:p>
-        </p:txBody>
-      </p:sp>
-      <p:sp>
-        <p:nvSpPr>
-          <p:cNvPr id="4" name="文本框 3"/>
-          <p:cNvSpPr txBox="1"/>
-          <p:nvPr/>
-        </p:nvSpPr>
-        <p:spPr>
-          <a:xfrm>
-            <a:off x="1119676" y="732925"/>
-            <a:ext cx="2659360" cy="646331"/>
-          </a:xfrm>
-          <a:prstGeom prst="rect">
-            <a:avLst/>
-          </a:prstGeom>
-          <a:solidFill>
-            <a:schemeClr val="accent1">
-              <a:lumMod val="20000"/>
-              <a:lumOff val="80000"/>
-            </a:schemeClr>
-          </a:solidFill>
-        </p:spPr>
-        <p:txBody>
-          <a:bodyPr wrap="square" rtlCol="0">
-            <a:spAutoFit/>
-          </a:bodyPr>
-          <a:lstStyle/>
-          <a:p>
-            <a:pPr algn="ctr"/>
-            <a:r>
-              <a:rPr lang="en-US" altLang="zh-CN" dirty="0"/>
-              <a:t>Focus on decision relevance</a:t>
-            </a:r>
-            <a:endParaRPr lang="zh-CN" altLang="en-US" dirty="0"/>
-          </a:p>
-        </p:txBody>
-      </p:sp>
-      <p:sp>
-        <p:nvSpPr>
-          <p:cNvPr id="5" name="文本框 4"/>
-          <p:cNvSpPr txBox="1"/>
-          <p:nvPr/>
-        </p:nvSpPr>
-        <p:spPr>
-          <a:xfrm>
-            <a:off x="1112400" y="1994823"/>
-            <a:ext cx="2570562" cy="369332"/>
-          </a:xfrm>
-          <a:prstGeom prst="rect">
-            <a:avLst/>
-          </a:prstGeom>
-          <a:solidFill>
-            <a:schemeClr val="accent1">
-              <a:lumMod val="20000"/>
-              <a:lumOff val="80000"/>
-            </a:schemeClr>
-          </a:solidFill>
-        </p:spPr>
-        <p:txBody>
-          <a:bodyPr wrap="square" rtlCol="0">
-            <a:spAutoFit/>
-          </a:bodyPr>
-          <a:lstStyle/>
-          <a:p>
-            <a:pPr algn="ctr"/>
-            <a:r>
-              <a:rPr lang="en-US" altLang="zh-CN" dirty="0"/>
-              <a:t>Re-parameterization</a:t>
-            </a:r>
-            <a:endParaRPr lang="zh-CN" altLang="en-US" dirty="0"/>
-          </a:p>
-        </p:txBody>
-      </p:sp>
-      <p:sp>
-        <p:nvSpPr>
-          <p:cNvPr id="6" name="文本框 5"/>
-          <p:cNvSpPr txBox="1"/>
-          <p:nvPr/>
-        </p:nvSpPr>
-        <p:spPr>
-          <a:xfrm>
-            <a:off x="1062617" y="3823130"/>
-            <a:ext cx="2637597" cy="646331"/>
-          </a:xfrm>
-          <a:prstGeom prst="rect">
-            <a:avLst/>
-          </a:prstGeom>
-          <a:solidFill>
-            <a:schemeClr val="accent1">
-              <a:lumMod val="20000"/>
-              <a:lumOff val="80000"/>
-            </a:schemeClr>
-          </a:solidFill>
-        </p:spPr>
-        <p:txBody>
-          <a:bodyPr wrap="square" rtlCol="0">
-            <a:spAutoFit/>
-          </a:bodyPr>
-          <a:lstStyle/>
-          <a:p>
-            <a:pPr algn="ctr"/>
-            <a:r>
-              <a:rPr lang="en-US" altLang="zh-CN" dirty="0"/>
-              <a:t>Adaptive evaluation and robustness assessment</a:t>
-            </a:r>
-            <a:endParaRPr lang="zh-CN" altLang="en-US" dirty="0"/>
-          </a:p>
-        </p:txBody>
-      </p:sp>
-      <p:sp>
-        <p:nvSpPr>
-          <p:cNvPr id="7" name="文本框 6"/>
-          <p:cNvSpPr txBox="1"/>
-          <p:nvPr/>
-        </p:nvSpPr>
-        <p:spPr>
-          <a:xfrm>
-            <a:off x="1093734" y="5514710"/>
-            <a:ext cx="2637597" cy="646331"/>
-          </a:xfrm>
-          <a:prstGeom prst="rect">
-            <a:avLst/>
-          </a:prstGeom>
-          <a:solidFill>
-            <a:schemeClr val="accent1">
-              <a:lumMod val="20000"/>
-              <a:lumOff val="80000"/>
-            </a:schemeClr>
-          </a:solidFill>
-        </p:spPr>
-        <p:txBody>
-          <a:bodyPr wrap="square" rtlCol="0">
-            <a:spAutoFit/>
-          </a:bodyPr>
-          <a:lstStyle/>
-          <a:p>
-            <a:pPr algn="ctr"/>
-            <a:r>
-              <a:rPr lang="en-US" altLang="zh-CN" dirty="0"/>
-              <a:t>Reconsider whether fixing is necessary</a:t>
-            </a:r>
-            <a:endParaRPr lang="zh-CN" altLang="en-US" dirty="0"/>
-          </a:p>
-        </p:txBody>
-      </p:sp>
-      <p:sp>
-        <p:nvSpPr>
-          <p:cNvPr id="11" name="文本框 10"/>
-          <p:cNvSpPr txBox="1"/>
-          <p:nvPr/>
-        </p:nvSpPr>
-        <p:spPr>
-          <a:xfrm>
-            <a:off x="3686738" y="413493"/>
-            <a:ext cx="3708693" cy="1231106"/>
-          </a:xfrm>
-          <a:prstGeom prst="rect">
-            <a:avLst/>
-          </a:prstGeom>
-          <a:solidFill>
-            <a:schemeClr val="bg1">
-              <a:lumMod val="95000"/>
-            </a:schemeClr>
-          </a:solidFill>
-        </p:spPr>
-        <p:txBody>
-          <a:bodyPr wrap="square" rtlCol="0">
-            <a:spAutoFit/>
-          </a:bodyPr>
-          <a:lstStyle/>
-          <a:p>
-            <a:pPr algn="ctr"/>
-            <a:r>
-              <a:rPr lang="en-US" altLang="zh-CN" dirty="0"/>
-              <a:t>Experiment plan</a:t>
-            </a:r>
-          </a:p>
-          <a:p>
-            <a:pPr marL="285750" indent="-285750">
-              <a:buFont typeface="Arial" panose="020B0604020202020204" pitchFamily="34" charset="0"/>
-              <a:buChar char="•"/>
-            </a:pPr>
-            <a:r>
-              <a:rPr lang="en-US" altLang="zh-CN" sz="1400" dirty="0"/>
-              <a:t>Fix parameters at average values of parameter distributions</a:t>
-            </a:r>
-          </a:p>
-          <a:p>
-            <a:pPr marL="285750" indent="-285750">
-              <a:buFont typeface="Arial" panose="020B0604020202020204" pitchFamily="34" charset="0"/>
-              <a:buChar char="•"/>
-            </a:pPr>
-            <a:r>
-              <a:rPr lang="en-US" altLang="zh-CN" sz="1400" dirty="0"/>
-              <a:t>Potential options of error measures used for measuring uncertainty</a:t>
-            </a:r>
-          </a:p>
-        </p:txBody>
-      </p:sp>
-      <p:sp>
-        <p:nvSpPr>
-          <p:cNvPr id="28" name="文本框 27"/>
-          <p:cNvSpPr txBox="1"/>
-          <p:nvPr/>
-        </p:nvSpPr>
-        <p:spPr>
-          <a:xfrm>
-            <a:off x="3686738" y="1781694"/>
-            <a:ext cx="3708693" cy="738664"/>
-          </a:xfrm>
-          <a:prstGeom prst="rect">
-            <a:avLst/>
-          </a:prstGeom>
-          <a:solidFill>
-            <a:schemeClr val="bg1">
-              <a:lumMod val="95000"/>
-            </a:schemeClr>
-          </a:solidFill>
-        </p:spPr>
-        <p:txBody>
-          <a:bodyPr wrap="square" rtlCol="0">
-            <a:spAutoFit/>
-          </a:bodyPr>
-          <a:lstStyle/>
-          <a:p>
-            <a:pPr marL="285750" indent="-285750">
-              <a:buFont typeface="Arial" panose="020B0604020202020204" pitchFamily="34" charset="0"/>
-              <a:buChar char="•"/>
-            </a:pPr>
-            <a:r>
-              <a:rPr lang="en-US" altLang="zh-CN" sz="1400" dirty="0"/>
-              <a:t>Identify multiplicative parameter relationships</a:t>
-            </a:r>
-          </a:p>
-          <a:p>
-            <a:pPr marL="285750" indent="-285750">
-              <a:buFont typeface="Arial" panose="020B0604020202020204" pitchFamily="34" charset="0"/>
-              <a:buChar char="•"/>
-            </a:pPr>
-            <a:r>
-              <a:rPr lang="en-US" altLang="zh-CN" sz="1400" dirty="0"/>
-              <a:t>Adjust parameter ranges and distributions</a:t>
-            </a:r>
-          </a:p>
-        </p:txBody>
-      </p:sp>
-      <p:sp>
-        <p:nvSpPr>
-          <p:cNvPr id="29" name="文本框 28"/>
-          <p:cNvSpPr txBox="1"/>
-          <p:nvPr/>
-        </p:nvSpPr>
-        <p:spPr>
-          <a:xfrm>
-            <a:off x="3698815" y="3297256"/>
-            <a:ext cx="3684539" cy="1661993"/>
-          </a:xfrm>
-          <a:prstGeom prst="rect">
-            <a:avLst/>
-          </a:prstGeom>
-          <a:solidFill>
-            <a:schemeClr val="bg1">
-              <a:lumMod val="95000"/>
-            </a:schemeClr>
-          </a:solidFill>
-        </p:spPr>
-        <p:txBody>
-          <a:bodyPr wrap="square" rtlCol="0">
-            <a:spAutoFit/>
-          </a:bodyPr>
-          <a:lstStyle/>
-          <a:p>
-            <a:pPr algn="ctr"/>
-            <a:r>
-              <a:rPr lang="en-US" altLang="zh-CN" dirty="0"/>
-              <a:t>Adaptive FF</a:t>
-            </a:r>
-          </a:p>
-          <a:p>
-            <a:pPr marL="285750" indent="-285750">
-              <a:buFont typeface="Arial" panose="020B0604020202020204" pitchFamily="34" charset="0"/>
-              <a:buChar char="•"/>
-            </a:pPr>
-            <a:r>
-              <a:rPr lang="en-US" altLang="zh-CN" sz="1400" dirty="0"/>
-              <a:t>Adaptive PCE based GSA and uncertainty-based parameter ranking</a:t>
-            </a:r>
-          </a:p>
-          <a:p>
-            <a:pPr marL="285750" indent="-285750">
-              <a:buFont typeface="Arial" panose="020B0604020202020204" pitchFamily="34" charset="0"/>
-              <a:buChar char="•"/>
-            </a:pPr>
-            <a:r>
-              <a:rPr lang="en-US" altLang="zh-CN" sz="1400" dirty="0"/>
-              <a:t>Approximate the error with a small sample size</a:t>
-            </a:r>
-          </a:p>
-          <a:p>
-            <a:pPr marL="285750" indent="-285750">
-              <a:buFont typeface="Arial" panose="020B0604020202020204" pitchFamily="34" charset="0"/>
-              <a:buChar char="•"/>
-            </a:pPr>
-            <a:r>
-              <a:rPr lang="en-US" altLang="zh-CN" sz="1400" dirty="0"/>
-              <a:t>Identify important parameters for varying and potential parameters to fix</a:t>
-            </a:r>
-          </a:p>
-        </p:txBody>
-      </p:sp>
-      <p:sp>
-        <p:nvSpPr>
-          <p:cNvPr id="30" name="文本框 29"/>
-          <p:cNvSpPr txBox="1"/>
-          <p:nvPr/>
-        </p:nvSpPr>
-        <p:spPr>
-          <a:xfrm>
-            <a:off x="3698815" y="5089322"/>
-            <a:ext cx="3684539" cy="1292662"/>
-          </a:xfrm>
-          <a:prstGeom prst="rect">
-            <a:avLst/>
-          </a:prstGeom>
-          <a:solidFill>
-            <a:schemeClr val="bg1">
-              <a:lumMod val="95000"/>
-            </a:schemeClr>
-          </a:solidFill>
-        </p:spPr>
-        <p:txBody>
-          <a:bodyPr wrap="square" rtlCol="0">
-            <a:spAutoFit/>
-          </a:bodyPr>
-          <a:lstStyle/>
-          <a:p>
-            <a:pPr algn="ctr"/>
-            <a:r>
-              <a:rPr lang="en-US" altLang="zh-CN" dirty="0"/>
-              <a:t> Robustness analysis of error measures</a:t>
-            </a:r>
-          </a:p>
-          <a:p>
-            <a:pPr marL="285750" indent="-285750">
-              <a:buFont typeface="Arial" panose="020B0604020202020204" pitchFamily="34" charset="0"/>
-              <a:buChar char="•"/>
-            </a:pPr>
-            <a:r>
-              <a:rPr lang="en-US" altLang="zh-CN" sz="1400" dirty="0"/>
-              <a:t>Increase sample size to assess the reliability of results</a:t>
-            </a:r>
-          </a:p>
-          <a:p>
-            <a:pPr marL="285750" indent="-285750">
-              <a:buFont typeface="Arial" panose="020B0604020202020204" pitchFamily="34" charset="0"/>
-              <a:buChar char="•"/>
-            </a:pPr>
-            <a:r>
-              <a:rPr lang="en-US" altLang="zh-CN" sz="1400" dirty="0"/>
-              <a:t>Reflection on FF and the next step</a:t>
-            </a:r>
-          </a:p>
-        </p:txBody>
-      </p:sp>
-      <p:sp>
-        <p:nvSpPr>
-          <p:cNvPr id="35" name="下弧形箭头 34"/>
-          <p:cNvSpPr/>
-          <p:nvPr/>
-        </p:nvSpPr>
-        <p:spPr>
-          <a:xfrm rot="16200000">
-            <a:off x="6742475" y="4153658"/>
-            <a:ext cx="1219483" cy="291376"/>
-          </a:xfrm>
-          <a:prstGeom prst="curvedUpArrow">
-            <a:avLst/>
-          </a:prstGeom>
-        </p:spPr>
-        <p:style>
-          <a:lnRef idx="2">
-            <a:schemeClr val="accent1">
-              <a:shade val="50000"/>
-            </a:schemeClr>
-          </a:lnRef>
-          <a:fillRef idx="1">
-            <a:schemeClr val="accent1"/>
-          </a:fillRef>
-          <a:effectRef idx="0">
-            <a:schemeClr val="accent1"/>
-          </a:effectRef>
-          <a:fontRef idx="minor">
-            <a:schemeClr val="lt1"/>
-          </a:fontRef>
-        </p:style>
-        <p:txBody>
-          <a:bodyPr rtlCol="0" anchor="ctr"/>
-          <a:lstStyle/>
-          <a:p>
-            <a:pPr algn="ctr"/>
-            <a:endParaRPr lang="zh-CN" altLang="en-US">
-              <a:solidFill>
-                <a:schemeClr val="tx1"/>
-              </a:solidFill>
-            </a:endParaRPr>
-          </a:p>
-        </p:txBody>
-      </p:sp>
-      <p:sp>
-        <p:nvSpPr>
-          <p:cNvPr id="37" name="左弧形箭头 36"/>
-          <p:cNvSpPr/>
-          <p:nvPr/>
-        </p:nvSpPr>
-        <p:spPr>
-          <a:xfrm flipV="1">
-            <a:off x="436957" y="1034257"/>
-            <a:ext cx="667679" cy="4701396"/>
-          </a:xfrm>
-          <a:prstGeom prst="curvedRightArrow">
-            <a:avLst/>
-          </a:prstGeom>
-        </p:spPr>
-        <p:style>
-          <a:lnRef idx="2">
-            <a:schemeClr val="accent1">
-              <a:shade val="50000"/>
-            </a:schemeClr>
-          </a:lnRef>
-          <a:fillRef idx="1">
-            <a:schemeClr val="accent1"/>
-          </a:fillRef>
-          <a:effectRef idx="0">
-            <a:schemeClr val="accent1"/>
-          </a:effectRef>
-          <a:fontRef idx="minor">
-            <a:schemeClr val="lt1"/>
-          </a:fontRef>
-        </p:style>
-        <p:txBody>
-          <a:bodyPr rtlCol="0" anchor="ctr"/>
-          <a:lstStyle/>
-          <a:p>
-            <a:pPr algn="ctr"/>
-            <a:endParaRPr lang="zh-CN" altLang="en-US">
-              <a:solidFill>
-                <a:schemeClr val="tx1"/>
-              </a:solidFill>
-            </a:endParaRPr>
-          </a:p>
-        </p:txBody>
-      </p:sp>
-      <p:sp>
-        <p:nvSpPr>
-          <p:cNvPr id="18" name="文本框 17"/>
-          <p:cNvSpPr txBox="1"/>
-          <p:nvPr/>
-        </p:nvSpPr>
-        <p:spPr>
-          <a:xfrm>
-            <a:off x="3686738" y="2658127"/>
-            <a:ext cx="3708693" cy="523220"/>
-          </a:xfrm>
-          <a:prstGeom prst="rect">
-            <a:avLst/>
-          </a:prstGeom>
-          <a:solidFill>
-            <a:schemeClr val="bg1">
-              <a:lumMod val="95000"/>
-            </a:schemeClr>
-          </a:solidFill>
-        </p:spPr>
-        <p:txBody>
-          <a:bodyPr wrap="square" rtlCol="0">
-            <a:spAutoFit/>
-          </a:bodyPr>
-          <a:lstStyle/>
-          <a:p>
-            <a:pPr marL="285750" indent="-285750">
-              <a:buFont typeface="Arial" panose="020B0604020202020204" pitchFamily="34" charset="0"/>
-              <a:buChar char="•"/>
-            </a:pPr>
-            <a:r>
-              <a:rPr lang="en-US" altLang="zh-CN" sz="1400" dirty="0"/>
-              <a:t>Run the model to generate samples for calibrating PCE</a:t>
-            </a:r>
-          </a:p>
-        </p:txBody>
-      </p:sp>
-      <p:sp>
-        <p:nvSpPr>
-          <p:cNvPr id="10" name="下箭头 9"/>
-          <p:cNvSpPr/>
-          <p:nvPr/>
-        </p:nvSpPr>
-        <p:spPr>
-          <a:xfrm>
-            <a:off x="5461081" y="1672750"/>
-            <a:ext cx="160006" cy="113061"/>
-          </a:xfrm>
-          <a:prstGeom prst="downArrow">
-            <a:avLst/>
-          </a:prstGeom>
-        </p:spPr>
-        <p:style>
-          <a:lnRef idx="2">
-            <a:schemeClr val="accent1">
-              <a:shade val="50000"/>
-            </a:schemeClr>
-          </a:lnRef>
-          <a:fillRef idx="1">
-            <a:schemeClr val="accent1"/>
-          </a:fillRef>
-          <a:effectRef idx="0">
-            <a:schemeClr val="accent1"/>
-          </a:effectRef>
-          <a:fontRef idx="minor">
-            <a:schemeClr val="lt1"/>
-          </a:fontRef>
-        </p:style>
-        <p:txBody>
-          <a:bodyPr rtlCol="0" anchor="ctr"/>
-          <a:lstStyle/>
-          <a:p>
-            <a:pPr algn="ctr"/>
-            <a:endParaRPr lang="zh-CN" altLang="en-US" dirty="0"/>
-          </a:p>
-        </p:txBody>
-      </p:sp>
-      <p:sp>
-        <p:nvSpPr>
-          <p:cNvPr id="21" name="下箭头 20"/>
-          <p:cNvSpPr/>
-          <p:nvPr/>
-        </p:nvSpPr>
-        <p:spPr>
-          <a:xfrm>
-            <a:off x="5461081" y="2537932"/>
-            <a:ext cx="160006" cy="113061"/>
-          </a:xfrm>
-          <a:prstGeom prst="downArrow">
-            <a:avLst/>
-          </a:prstGeom>
-        </p:spPr>
-        <p:style>
-          <a:lnRef idx="2">
-            <a:schemeClr val="accent1">
-              <a:shade val="50000"/>
-            </a:schemeClr>
-          </a:lnRef>
-          <a:fillRef idx="1">
-            <a:schemeClr val="accent1"/>
-          </a:fillRef>
-          <a:effectRef idx="0">
-            <a:schemeClr val="accent1"/>
-          </a:effectRef>
-          <a:fontRef idx="minor">
-            <a:schemeClr val="lt1"/>
-          </a:fontRef>
-        </p:style>
-        <p:txBody>
-          <a:bodyPr rtlCol="0" anchor="ctr"/>
-          <a:lstStyle/>
-          <a:p>
-            <a:pPr algn="ctr"/>
-            <a:endParaRPr lang="zh-CN" altLang="en-US"/>
-          </a:p>
-        </p:txBody>
-      </p:sp>
-      <p:sp>
-        <p:nvSpPr>
-          <p:cNvPr id="22" name="下箭头 21"/>
-          <p:cNvSpPr/>
-          <p:nvPr/>
-        </p:nvSpPr>
-        <p:spPr>
-          <a:xfrm>
-            <a:off x="5461081" y="3177445"/>
-            <a:ext cx="160006" cy="113061"/>
-          </a:xfrm>
-          <a:prstGeom prst="downArrow">
-            <a:avLst/>
-          </a:prstGeom>
-        </p:spPr>
-        <p:style>
-          <a:lnRef idx="2">
-            <a:schemeClr val="accent1">
-              <a:shade val="50000"/>
-            </a:schemeClr>
-          </a:lnRef>
-          <a:fillRef idx="1">
-            <a:schemeClr val="accent1"/>
-          </a:fillRef>
-          <a:effectRef idx="0">
-            <a:schemeClr val="accent1"/>
-          </a:effectRef>
-          <a:fontRef idx="minor">
-            <a:schemeClr val="lt1"/>
-          </a:fontRef>
-        </p:style>
-        <p:txBody>
-          <a:bodyPr rtlCol="0" anchor="ctr"/>
-          <a:lstStyle/>
-          <a:p>
-            <a:pPr algn="ctr"/>
-            <a:endParaRPr lang="zh-CN" altLang="en-US"/>
-          </a:p>
-        </p:txBody>
-      </p:sp>
-      <p:sp>
-        <p:nvSpPr>
-          <p:cNvPr id="23" name="下箭头 22"/>
-          <p:cNvSpPr/>
-          <p:nvPr/>
-        </p:nvSpPr>
-        <p:spPr>
-          <a:xfrm>
-            <a:off x="5461081" y="4964537"/>
-            <a:ext cx="160006" cy="113061"/>
-          </a:xfrm>
-          <a:prstGeom prst="downArrow">
-            <a:avLst/>
-          </a:prstGeom>
-        </p:spPr>
-        <p:style>
-          <a:lnRef idx="2">
-            <a:schemeClr val="accent1">
-              <a:shade val="50000"/>
-            </a:schemeClr>
-          </a:lnRef>
-          <a:fillRef idx="1">
-            <a:schemeClr val="accent1"/>
-          </a:fillRef>
-          <a:effectRef idx="0">
-            <a:schemeClr val="accent1"/>
-          </a:effectRef>
-          <a:fontRef idx="minor">
-            <a:schemeClr val="lt1"/>
-          </a:fontRef>
-        </p:style>
-        <p:txBody>
-          <a:bodyPr rtlCol="0" anchor="ctr"/>
-          <a:lstStyle/>
-          <a:p>
-            <a:pPr algn="ctr"/>
-            <a:endParaRPr lang="zh-CN" altLang="en-US"/>
-          </a:p>
-        </p:txBody>
-      </p:sp>
-      <p:sp>
-        <p:nvSpPr>
-          <p:cNvPr id="3" name="文本框 2"/>
-          <p:cNvSpPr txBox="1"/>
-          <p:nvPr/>
-        </p:nvSpPr>
-        <p:spPr>
-          <a:xfrm>
-            <a:off x="7612453" y="2093263"/>
-            <a:ext cx="4004814" cy="523220"/>
-          </a:xfrm>
-          <a:prstGeom prst="rect">
-            <a:avLst/>
-          </a:prstGeom>
-          <a:noFill/>
-        </p:spPr>
-        <p:txBody>
-          <a:bodyPr wrap="none" rtlCol="0">
-            <a:spAutoFit/>
-          </a:bodyPr>
-          <a:lstStyle/>
-          <a:p>
-            <a:pPr marL="285750" indent="-285750">
-              <a:buFont typeface="Wingdings" panose="05000000000000000000" pitchFamily="2" charset="2"/>
-              <a:buChar char="q"/>
-            </a:pPr>
-            <a:r>
-              <a:rPr lang="en-US" altLang="zh-CN" sz="1400" dirty="0"/>
-              <a:t>Section 5.1</a:t>
-            </a:r>
-          </a:p>
-          <a:p>
-            <a:r>
-              <a:rPr lang="en-US" altLang="zh-CN" sz="1400" dirty="0"/>
-              <a:t>PCE validation with effect of parameter distributions</a:t>
-            </a:r>
-          </a:p>
-        </p:txBody>
-      </p:sp>
-      <p:sp>
-        <p:nvSpPr>
-          <p:cNvPr id="8" name="文本框 7"/>
-          <p:cNvSpPr txBox="1"/>
-          <p:nvPr/>
-        </p:nvSpPr>
-        <p:spPr>
-          <a:xfrm>
-            <a:off x="7612452" y="2591372"/>
-            <a:ext cx="3997569" cy="523220"/>
-          </a:xfrm>
-          <a:prstGeom prst="rect">
-            <a:avLst/>
-          </a:prstGeom>
-          <a:noFill/>
-        </p:spPr>
-        <p:txBody>
-          <a:bodyPr wrap="none" rtlCol="0">
-            <a:spAutoFit/>
-          </a:bodyPr>
-          <a:lstStyle/>
-          <a:p>
-            <a:pPr marL="285750" indent="-285750">
-              <a:buFont typeface="Wingdings" panose="05000000000000000000" pitchFamily="2" charset="2"/>
-              <a:buChar char="q"/>
-            </a:pPr>
-            <a:r>
-              <a:rPr lang="en-US" altLang="zh-CN" sz="1400" dirty="0"/>
-              <a:t>Section 5.2</a:t>
-            </a:r>
-          </a:p>
-          <a:p>
-            <a:r>
-              <a:rPr lang="en-US" altLang="zh-CN" sz="1400" dirty="0"/>
-              <a:t>Effect of parameter distributions on sensitivity index</a:t>
-            </a:r>
-            <a:endParaRPr lang="zh-CN" altLang="en-US" sz="1400" dirty="0"/>
-          </a:p>
-        </p:txBody>
-      </p:sp>
-      <p:sp>
-        <p:nvSpPr>
-          <p:cNvPr id="9" name="文本框 8"/>
-          <p:cNvSpPr txBox="1"/>
-          <p:nvPr/>
-        </p:nvSpPr>
-        <p:spPr>
-          <a:xfrm>
-            <a:off x="7617030" y="3876213"/>
-            <a:ext cx="3812969" cy="738664"/>
-          </a:xfrm>
-          <a:prstGeom prst="rect">
-            <a:avLst/>
-          </a:prstGeom>
-          <a:noFill/>
-        </p:spPr>
-        <p:txBody>
-          <a:bodyPr wrap="square" rtlCol="0">
-            <a:spAutoFit/>
-          </a:bodyPr>
-          <a:lstStyle/>
-          <a:p>
-            <a:pPr marL="285750" indent="-285750">
-              <a:buFont typeface="Wingdings" panose="05000000000000000000" pitchFamily="2" charset="2"/>
-              <a:buChar char="q"/>
-            </a:pPr>
-            <a:r>
-              <a:rPr lang="en-US" altLang="zh-CN" sz="1400" dirty="0"/>
-              <a:t>Section 5.3</a:t>
-            </a:r>
-          </a:p>
-          <a:p>
-            <a:r>
-              <a:rPr lang="en-US" altLang="zh-CN" sz="1400" dirty="0"/>
-              <a:t>Adaptive figure, approximation of error, and the decision on sample size</a:t>
-            </a:r>
-          </a:p>
-        </p:txBody>
-      </p:sp>
-      <p:sp>
-        <p:nvSpPr>
-          <p:cNvPr id="12" name="文本框 11"/>
-          <p:cNvSpPr txBox="1"/>
-          <p:nvPr/>
-        </p:nvSpPr>
-        <p:spPr>
-          <a:xfrm>
-            <a:off x="7612453" y="5397100"/>
-            <a:ext cx="2839752" cy="738664"/>
-          </a:xfrm>
-          <a:prstGeom prst="rect">
-            <a:avLst/>
-          </a:prstGeom>
-          <a:noFill/>
-        </p:spPr>
-        <p:txBody>
-          <a:bodyPr wrap="none" rtlCol="0">
-            <a:spAutoFit/>
-          </a:bodyPr>
-          <a:lstStyle/>
-          <a:p>
-            <a:pPr marL="285750" indent="-285750">
-              <a:buFont typeface="Wingdings" panose="05000000000000000000" pitchFamily="2" charset="2"/>
-              <a:buChar char="q"/>
-            </a:pPr>
-            <a:r>
-              <a:rPr lang="en-US" altLang="zh-CN" sz="1400" dirty="0"/>
-              <a:t>Sections 5.4 &amp; 5.5</a:t>
-            </a:r>
-          </a:p>
-          <a:p>
-            <a:r>
-              <a:rPr lang="en-US" altLang="zh-CN" sz="1400" dirty="0"/>
-              <a:t>Effect</a:t>
-            </a:r>
-            <a:r>
-              <a:rPr lang="zh-CN" altLang="en-US" sz="1400" dirty="0"/>
-              <a:t> </a:t>
-            </a:r>
-            <a:r>
-              <a:rPr lang="en-US" altLang="zh-CN" sz="1400" dirty="0"/>
-              <a:t>of uncertainty communication</a:t>
-            </a:r>
-          </a:p>
-          <a:p>
-            <a:r>
-              <a:rPr lang="en-US" altLang="zh-CN" sz="1400" dirty="0"/>
-              <a:t>Robustness assessment</a:t>
-            </a:r>
-            <a:endParaRPr lang="zh-CN" altLang="en-US" sz="1400" dirty="0"/>
-          </a:p>
-        </p:txBody>
-      </p:sp>
-      <p:sp>
-        <p:nvSpPr>
-          <p:cNvPr id="26" name="文本框 25"/>
-          <p:cNvSpPr txBox="1"/>
-          <p:nvPr/>
-        </p:nvSpPr>
-        <p:spPr>
-          <a:xfrm>
-            <a:off x="1444667" y="4477098"/>
-            <a:ext cx="2132315" cy="307777"/>
-          </a:xfrm>
-          <a:prstGeom prst="rect">
-            <a:avLst/>
-          </a:prstGeom>
-          <a:noFill/>
-        </p:spPr>
-        <p:txBody>
-          <a:bodyPr wrap="none" rtlCol="0">
-            <a:spAutoFit/>
-          </a:bodyPr>
-          <a:lstStyle/>
-          <a:p>
-            <a:pPr marL="285750" indent="-285750">
-              <a:buFont typeface="Wingdings" panose="05000000000000000000" pitchFamily="2" charset="2"/>
-              <a:buChar char="q"/>
-            </a:pPr>
-            <a:r>
-              <a:rPr lang="en-US" altLang="zh-CN" sz="1400" dirty="0"/>
-              <a:t>Discussion: Section 6.1</a:t>
-            </a:r>
-            <a:endParaRPr lang="zh-CN" altLang="en-US" sz="1400" dirty="0"/>
-          </a:p>
-        </p:txBody>
-      </p:sp>
-      <p:sp>
-        <p:nvSpPr>
-          <p:cNvPr id="14" name="TextBox 13"/>
-          <p:cNvSpPr txBox="1"/>
-          <p:nvPr/>
-        </p:nvSpPr>
-        <p:spPr>
-          <a:xfrm>
-            <a:off x="7711658" y="1732244"/>
-            <a:ext cx="1575933" cy="369332"/>
-          </a:xfrm>
-          <a:prstGeom prst="rect">
-            <a:avLst/>
-          </a:prstGeom>
-          <a:solidFill>
-            <a:schemeClr val="bg2">
-              <a:lumMod val="90000"/>
-            </a:schemeClr>
-          </a:solidFill>
-        </p:spPr>
-        <p:txBody>
-          <a:bodyPr wrap="square" rtlCol="0">
-            <a:spAutoFit/>
-          </a:bodyPr>
-          <a:lstStyle/>
-          <a:p>
-            <a:pPr algn="ctr"/>
-            <a:r>
-              <a:rPr lang="en-US" dirty="0"/>
-              <a:t>Results</a:t>
-            </a:r>
-            <a:endParaRPr lang="en-AU" dirty="0"/>
-          </a:p>
-        </p:txBody>
-      </p:sp>
-      <p:sp>
-        <p:nvSpPr>
-          <p:cNvPr id="34" name="Rounded Rectangle 33"/>
-          <p:cNvSpPr/>
-          <p:nvPr/>
-        </p:nvSpPr>
-        <p:spPr>
-          <a:xfrm>
-            <a:off x="7605034" y="2109518"/>
-            <a:ext cx="3997569" cy="1082949"/>
-          </a:xfrm>
-          <a:prstGeom prst="roundRect">
-            <a:avLst/>
-          </a:prstGeom>
-          <a:noFill/>
-          <a:ln>
-            <a:solidFill>
-              <a:schemeClr val="bg2">
-                <a:lumMod val="50000"/>
-              </a:schemeClr>
-            </a:solidFill>
-          </a:ln>
-        </p:spPr>
-        <p:style>
-          <a:lnRef idx="2">
-            <a:schemeClr val="accent1">
-              <a:shade val="50000"/>
-            </a:schemeClr>
-          </a:lnRef>
-          <a:fillRef idx="1">
-            <a:schemeClr val="accent1"/>
-          </a:fillRef>
-          <a:effectRef idx="0">
-            <a:schemeClr val="accent1"/>
-          </a:effectRef>
-          <a:fontRef idx="minor">
-            <a:schemeClr val="lt1"/>
-          </a:fontRef>
-        </p:style>
-        <p:txBody>
-          <a:bodyPr rtlCol="0" anchor="ctr"/>
-          <a:lstStyle/>
-          <a:p>
-            <a:pPr algn="ctr"/>
-            <a:endParaRPr lang="en-AU"/>
-          </a:p>
-        </p:txBody>
-      </p:sp>
-      <p:sp>
-        <p:nvSpPr>
-          <p:cNvPr id="38" name="Rounded Rectangle 37"/>
-          <p:cNvSpPr/>
-          <p:nvPr/>
-        </p:nvSpPr>
-        <p:spPr>
-          <a:xfrm>
-            <a:off x="7612452" y="3858341"/>
-            <a:ext cx="3997569" cy="833457"/>
-          </a:xfrm>
-          <a:prstGeom prst="roundRect">
-            <a:avLst/>
-          </a:prstGeom>
-          <a:noFill/>
-          <a:ln>
-            <a:solidFill>
-              <a:schemeClr val="bg2">
-                <a:lumMod val="50000"/>
-              </a:schemeClr>
-            </a:solidFill>
-          </a:ln>
-        </p:spPr>
-        <p:style>
-          <a:lnRef idx="2">
-            <a:schemeClr val="accent1">
-              <a:shade val="50000"/>
-            </a:schemeClr>
-          </a:lnRef>
-          <a:fillRef idx="1">
-            <a:schemeClr val="accent1"/>
-          </a:fillRef>
-          <a:effectRef idx="0">
-            <a:schemeClr val="accent1"/>
-          </a:effectRef>
-          <a:fontRef idx="minor">
-            <a:schemeClr val="lt1"/>
-          </a:fontRef>
-        </p:style>
-        <p:txBody>
-          <a:bodyPr rtlCol="0" anchor="ctr"/>
-          <a:lstStyle/>
-          <a:p>
-            <a:pPr algn="ctr"/>
-            <a:endParaRPr lang="en-AU"/>
-          </a:p>
-        </p:txBody>
-      </p:sp>
-      <p:sp>
-        <p:nvSpPr>
-          <p:cNvPr id="39" name="Rounded Rectangle 38"/>
-          <p:cNvSpPr/>
-          <p:nvPr/>
-        </p:nvSpPr>
-        <p:spPr>
-          <a:xfrm>
-            <a:off x="7605033" y="5349703"/>
-            <a:ext cx="3997569" cy="833457"/>
-          </a:xfrm>
-          <a:prstGeom prst="roundRect">
-            <a:avLst/>
-          </a:prstGeom>
-          <a:noFill/>
-          <a:ln>
-            <a:solidFill>
-              <a:schemeClr val="bg2">
-                <a:lumMod val="50000"/>
-              </a:schemeClr>
-            </a:solidFill>
-          </a:ln>
-        </p:spPr>
-        <p:style>
-          <a:lnRef idx="2">
-            <a:schemeClr val="accent1">
-              <a:shade val="50000"/>
-            </a:schemeClr>
-          </a:lnRef>
-          <a:fillRef idx="1">
-            <a:schemeClr val="accent1"/>
-          </a:fillRef>
-          <a:effectRef idx="0">
-            <a:schemeClr val="accent1"/>
-          </a:effectRef>
-          <a:fontRef idx="minor">
-            <a:schemeClr val="lt1"/>
-          </a:fontRef>
-        </p:style>
-        <p:txBody>
-          <a:bodyPr rtlCol="0" anchor="ctr"/>
-          <a:lstStyle/>
-          <a:p>
-            <a:pPr algn="ctr"/>
-            <a:endParaRPr lang="en-AU"/>
-          </a:p>
-        </p:txBody>
-      </p:sp>
-      <p:sp>
-        <p:nvSpPr>
-          <p:cNvPr id="36" name="Right Brace 35"/>
-          <p:cNvSpPr/>
-          <p:nvPr/>
-        </p:nvSpPr>
-        <p:spPr>
-          <a:xfrm>
-            <a:off x="7395431" y="2236122"/>
-            <a:ext cx="102474" cy="828592"/>
-          </a:xfrm>
-          <a:prstGeom prst="rightBrace">
-            <a:avLst/>
-          </a:prstGeom>
-          <a:ln w="12700">
-            <a:solidFill>
-              <a:schemeClr val="bg2">
-                <a:lumMod val="50000"/>
-              </a:schemeClr>
-            </a:solidFill>
-          </a:ln>
-        </p:spPr>
-        <p:style>
-          <a:lnRef idx="1">
-            <a:schemeClr val="dk1"/>
-          </a:lnRef>
-          <a:fillRef idx="0">
-            <a:schemeClr val="dk1"/>
-          </a:fillRef>
-          <a:effectRef idx="0">
-            <a:schemeClr val="dk1"/>
-          </a:effectRef>
-          <a:fontRef idx="minor">
-            <a:schemeClr val="tx1"/>
-          </a:fontRef>
-        </p:style>
-        <p:txBody>
-          <a:bodyPr rtlCol="0" anchor="ctr"/>
-          <a:lstStyle/>
-          <a:p>
-            <a:pPr algn="ctr"/>
-            <a:endParaRPr lang="en-AU"/>
-          </a:p>
-        </p:txBody>
-      </p:sp>
-      <p:sp>
-        <p:nvSpPr>
-          <p:cNvPr id="31" name="文本框 25"/>
-          <p:cNvSpPr txBox="1"/>
-          <p:nvPr/>
-        </p:nvSpPr>
-        <p:spPr>
-          <a:xfrm>
-            <a:off x="1444666" y="6109311"/>
-            <a:ext cx="2132315" cy="307777"/>
-          </a:xfrm>
-          <a:prstGeom prst="rect">
-            <a:avLst/>
-          </a:prstGeom>
-          <a:noFill/>
-        </p:spPr>
-        <p:txBody>
-          <a:bodyPr wrap="none" rtlCol="0">
-            <a:spAutoFit/>
-          </a:bodyPr>
-          <a:lstStyle/>
-          <a:p>
-            <a:pPr marL="285750" indent="-285750">
-              <a:buFont typeface="Wingdings" panose="05000000000000000000" pitchFamily="2" charset="2"/>
-              <a:buChar char="q"/>
-            </a:pPr>
-            <a:r>
-              <a:rPr lang="en-US" altLang="zh-CN" sz="1400" dirty="0"/>
-              <a:t>Discussion: Section 6.2</a:t>
-            </a:r>
-            <a:endParaRPr lang="zh-CN" altLang="en-US" sz="1400" dirty="0"/>
-          </a:p>
-        </p:txBody>
-      </p:sp>
-    </p:spTree>
-    <p:extLst>
-      <p:ext uri="{BB962C8B-B14F-4D97-AF65-F5344CB8AC3E}">
-        <p14:creationId xmlns:p14="http://schemas.microsoft.com/office/powerpoint/2010/main" val="1352020292"/>
-      </p:ext>
-    </p:extLst>
-  </p:cSld>
-  <p:clrMapOvr>
-    <a:masterClrMapping/>
-  </p:clrMapOvr>
-</p:sld>
-</file>
-
-<file path=ppt/slides/slide2.xml><?xml version="1.0" encoding="utf-8"?>
-<p:sld xmlns:a="http://schemas.openxmlformats.org/drawingml/2006/main" xmlns:r="http://schemas.openxmlformats.org/officeDocument/2006/relationships" xmlns:p="http://schemas.openxmlformats.org/presentationml/2006/main">
-  <p:cSld>
-    <p:spTree>
-      <p:nvGrpSpPr>
-        <p:cNvPr id="1" name=""/>
-        <p:cNvGrpSpPr/>
-        <p:nvPr/>
-      </p:nvGrpSpPr>
-      <p:grpSpPr>
-        <a:xfrm>
-          <a:off x="0" y="0"/>
-          <a:ext cx="0" cy="0"/>
-          <a:chOff x="0" y="0"/>
-          <a:chExt cx="0" cy="0"/>
-        </a:xfrm>
-      </p:grpSpPr>
-      <p:sp>
-        <p:nvSpPr>
           <p:cNvPr id="19" name="Pentagon 18"/>
           <p:cNvSpPr/>
           <p:nvPr/>
@@ -4981,7 +3790,1666 @@
 </p:sld>
 </file>
 
+<file path=ppt/slides/slide2.xml><?xml version="1.0" encoding="utf-8"?>
+<p:sld xmlns:a="http://schemas.openxmlformats.org/drawingml/2006/main" xmlns:r="http://schemas.openxmlformats.org/officeDocument/2006/relationships" xmlns:p="http://schemas.openxmlformats.org/presentationml/2006/main">
+  <p:cSld>
+    <p:spTree>
+      <p:nvGrpSpPr>
+        <p:cNvPr id="1" name=""/>
+        <p:cNvGrpSpPr/>
+        <p:nvPr/>
+      </p:nvGrpSpPr>
+      <p:grpSpPr>
+        <a:xfrm>
+          <a:off x="0" y="0"/>
+          <a:ext cx="0" cy="0"/>
+          <a:chOff x="0" y="0"/>
+          <a:chExt cx="0" cy="0"/>
+        </a:xfrm>
+      </p:grpSpPr>
+      <p:pic>
+        <p:nvPicPr>
+          <p:cNvPr id="4" name="图片 3">
+            <a:extLst>
+              <a:ext uri="{FF2B5EF4-FFF2-40B4-BE49-F238E27FC236}">
+                <a16:creationId xmlns:a16="http://schemas.microsoft.com/office/drawing/2014/main" id="{0CC67A13-4353-4C33-A755-7653D597E5C9}"/>
+              </a:ext>
+            </a:extLst>
+          </p:cNvPr>
+          <p:cNvPicPr>
+            <a:picLocks noChangeAspect="1"/>
+          </p:cNvPicPr>
+          <p:nvPr/>
+        </p:nvPicPr>
+        <p:blipFill rotWithShape="1">
+          <a:blip r:embed="rId2" cstate="print">
+            <a:extLst>
+              <a:ext uri="{28A0092B-C50C-407E-A947-70E740481C1C}">
+                <a14:useLocalDpi xmlns:a14="http://schemas.microsoft.com/office/drawing/2010/main" val="0"/>
+              </a:ext>
+            </a:extLst>
+          </a:blip>
+          <a:srcRect l="29072" t="27151" r="19788" b="25181"/>
+          <a:stretch/>
+        </p:blipFill>
+        <p:spPr>
+          <a:xfrm>
+            <a:off x="3493651" y="1936391"/>
+            <a:ext cx="2498161" cy="3297637"/>
+          </a:xfrm>
+          <a:prstGeom prst="rect">
+            <a:avLst/>
+          </a:prstGeom>
+        </p:spPr>
+      </p:pic>
+      <p:grpSp>
+        <p:nvGrpSpPr>
+          <p:cNvPr id="15" name="组合 14">
+            <a:extLst>
+              <a:ext uri="{FF2B5EF4-FFF2-40B4-BE49-F238E27FC236}">
+                <a16:creationId xmlns:a16="http://schemas.microsoft.com/office/drawing/2014/main" id="{31524AA8-6E6C-4B31-B904-52C0F03ED427}"/>
+              </a:ext>
+            </a:extLst>
+          </p:cNvPr>
+          <p:cNvGrpSpPr/>
+          <p:nvPr/>
+        </p:nvGrpSpPr>
+        <p:grpSpPr>
+          <a:xfrm>
+            <a:off x="6065203" y="3665220"/>
+            <a:ext cx="1098958" cy="1467623"/>
+            <a:chOff x="5546521" y="962637"/>
+            <a:chExt cx="1098958" cy="1619075"/>
+          </a:xfrm>
+        </p:grpSpPr>
+        <p:pic>
+          <p:nvPicPr>
+            <p:cNvPr id="3" name="图片 2">
+              <a:extLst>
+                <a:ext uri="{FF2B5EF4-FFF2-40B4-BE49-F238E27FC236}">
+                  <a16:creationId xmlns:a16="http://schemas.microsoft.com/office/drawing/2014/main" id="{7FF24FA6-02FC-4BF6-9CA6-9F2684530128}"/>
+                </a:ext>
+              </a:extLst>
+            </p:cNvPr>
+            <p:cNvPicPr>
+              <a:picLocks noChangeAspect="1"/>
+            </p:cNvPicPr>
+            <p:nvPr/>
+          </p:nvPicPr>
+          <p:blipFill rotWithShape="1">
+            <a:blip r:embed="rId3" cstate="print">
+              <a:extLst>
+                <a:ext uri="{28A0092B-C50C-407E-A947-70E740481C1C}">
+                  <a14:useLocalDpi xmlns:a14="http://schemas.microsoft.com/office/drawing/2010/main" val="0"/>
+                </a:ext>
+              </a:extLst>
+            </a:blip>
+            <a:srcRect l="33601" t="41223" r="43706" b="35168"/>
+            <a:stretch/>
+          </p:blipFill>
+          <p:spPr>
+            <a:xfrm>
+              <a:off x="5546521" y="962637"/>
+              <a:ext cx="1098958" cy="1619075"/>
+            </a:xfrm>
+            <a:prstGeom prst="rect">
+              <a:avLst/>
+            </a:prstGeom>
+            <a:ln w="6350" cap="sq">
+              <a:solidFill>
+                <a:srgbClr val="000000"/>
+              </a:solidFill>
+              <a:prstDash val="solid"/>
+              <a:miter lim="800000"/>
+            </a:ln>
+            <a:effectLst>
+              <a:outerShdw blurRad="50800" dist="38100" dir="2700000" algn="tl" rotWithShape="0">
+                <a:srgbClr val="000000">
+                  <a:alpha val="43000"/>
+                </a:srgbClr>
+              </a:outerShdw>
+            </a:effectLst>
+          </p:spPr>
+        </p:pic>
+        <p:sp>
+          <p:nvSpPr>
+            <p:cNvPr id="16" name="文本框 15">
+              <a:extLst>
+                <a:ext uri="{FF2B5EF4-FFF2-40B4-BE49-F238E27FC236}">
+                  <a16:creationId xmlns:a16="http://schemas.microsoft.com/office/drawing/2014/main" id="{AB4F5715-82BB-4DCF-B59F-4FCCD142B838}"/>
+                </a:ext>
+              </a:extLst>
+            </p:cNvPr>
+            <p:cNvSpPr txBox="1"/>
+            <p:nvPr/>
+          </p:nvSpPr>
+          <p:spPr>
+            <a:xfrm>
+              <a:off x="5558605" y="2138328"/>
+              <a:ext cx="860684" cy="441400"/>
+            </a:xfrm>
+            <a:prstGeom prst="rect">
+              <a:avLst/>
+            </a:prstGeom>
+            <a:noFill/>
+          </p:spPr>
+          <p:txBody>
+            <a:bodyPr wrap="square" rtlCol="0">
+              <a:spAutoFit/>
+            </a:bodyPr>
+            <a:lstStyle/>
+            <a:p>
+              <a:r>
+                <a:rPr lang="en-US" altLang="zh-CN" sz="1000" dirty="0">
+                  <a:latin typeface="Arial" panose="020B0604020202020204" pitchFamily="34" charset="0"/>
+                  <a:cs typeface="Arial" panose="020B0604020202020204" pitchFamily="34" charset="0"/>
+                </a:rPr>
+                <a:t>Mackay Whitsunday</a:t>
+              </a:r>
+              <a:endParaRPr lang="zh-CN" altLang="en-US" sz="1000" dirty="0">
+                <a:latin typeface="Arial" panose="020B0604020202020204" pitchFamily="34" charset="0"/>
+                <a:cs typeface="Arial" panose="020B0604020202020204" pitchFamily="34" charset="0"/>
+              </a:endParaRPr>
+            </a:p>
+          </p:txBody>
+        </p:sp>
+      </p:grpSp>
+      <p:grpSp>
+        <p:nvGrpSpPr>
+          <p:cNvPr id="49" name="组合 48">
+            <a:extLst>
+              <a:ext uri="{FF2B5EF4-FFF2-40B4-BE49-F238E27FC236}">
+                <a16:creationId xmlns:a16="http://schemas.microsoft.com/office/drawing/2014/main" id="{EDDF3036-65C2-427D-B645-163807D421F5}"/>
+              </a:ext>
+            </a:extLst>
+          </p:cNvPr>
+          <p:cNvGrpSpPr/>
+          <p:nvPr/>
+        </p:nvGrpSpPr>
+        <p:grpSpPr>
+          <a:xfrm>
+            <a:off x="6022682" y="1960596"/>
+            <a:ext cx="1333599" cy="1543515"/>
+            <a:chOff x="6137629" y="723435"/>
+            <a:chExt cx="1486419" cy="1696920"/>
+          </a:xfrm>
+        </p:grpSpPr>
+        <p:pic>
+          <p:nvPicPr>
+            <p:cNvPr id="35" name="图片 34">
+              <a:extLst>
+                <a:ext uri="{FF2B5EF4-FFF2-40B4-BE49-F238E27FC236}">
+                  <a16:creationId xmlns:a16="http://schemas.microsoft.com/office/drawing/2014/main" id="{9DB24E35-FE28-44D5-BADA-85D851607CCF}"/>
+                </a:ext>
+              </a:extLst>
+            </p:cNvPr>
+            <p:cNvPicPr>
+              <a:picLocks noChangeAspect="1"/>
+            </p:cNvPicPr>
+            <p:nvPr/>
+          </p:nvPicPr>
+          <p:blipFill rotWithShape="1">
+            <a:blip r:embed="rId4" cstate="print">
+              <a:extLst>
+                <a:ext uri="{28A0092B-C50C-407E-A947-70E740481C1C}">
+                  <a14:useLocalDpi xmlns:a14="http://schemas.microsoft.com/office/drawing/2010/main" val="0"/>
+                </a:ext>
+              </a:extLst>
+            </a:blip>
+            <a:srcRect l="32377" t="30000" r="21047" b="31666"/>
+            <a:stretch/>
+          </p:blipFill>
+          <p:spPr>
+            <a:xfrm>
+              <a:off x="6168152" y="723435"/>
+              <a:ext cx="1455896" cy="1696920"/>
+            </a:xfrm>
+            <a:prstGeom prst="rect">
+              <a:avLst/>
+            </a:prstGeom>
+          </p:spPr>
+        </p:pic>
+        <p:sp>
+          <p:nvSpPr>
+            <p:cNvPr id="37" name="文本框 36">
+              <a:extLst>
+                <a:ext uri="{FF2B5EF4-FFF2-40B4-BE49-F238E27FC236}">
+                  <a16:creationId xmlns:a16="http://schemas.microsoft.com/office/drawing/2014/main" id="{A538FDC0-85C5-499D-8209-131D5EE26BCD}"/>
+                </a:ext>
+              </a:extLst>
+            </p:cNvPr>
+            <p:cNvSpPr txBox="1"/>
+            <p:nvPr/>
+          </p:nvSpPr>
+          <p:spPr>
+            <a:xfrm>
+              <a:off x="6137629" y="1490096"/>
+              <a:ext cx="1002926" cy="270692"/>
+            </a:xfrm>
+            <a:prstGeom prst="rect">
+              <a:avLst/>
+            </a:prstGeom>
+            <a:noFill/>
+          </p:spPr>
+          <p:txBody>
+            <a:bodyPr wrap="square" rtlCol="0">
+              <a:spAutoFit/>
+            </a:bodyPr>
+            <a:lstStyle/>
+            <a:p>
+              <a:r>
+                <a:rPr lang="en-US" altLang="zh-CN" sz="1000" dirty="0">
+                  <a:latin typeface="Arial" panose="020B0604020202020204" pitchFamily="34" charset="0"/>
+                  <a:cs typeface="Arial" panose="020B0604020202020204" pitchFamily="34" charset="0"/>
+                </a:rPr>
+                <a:t>Queensland</a:t>
+              </a:r>
+              <a:endParaRPr lang="zh-CN" altLang="en-US" sz="1000" dirty="0">
+                <a:latin typeface="Arial" panose="020B0604020202020204" pitchFamily="34" charset="0"/>
+                <a:cs typeface="Arial" panose="020B0604020202020204" pitchFamily="34" charset="0"/>
+              </a:endParaRPr>
+            </a:p>
+          </p:txBody>
+        </p:sp>
+      </p:grpSp>
+      <p:cxnSp>
+        <p:nvCxnSpPr>
+          <p:cNvPr id="11" name="直接连接符 10">
+            <a:extLst>
+              <a:ext uri="{FF2B5EF4-FFF2-40B4-BE49-F238E27FC236}">
+                <a16:creationId xmlns:a16="http://schemas.microsoft.com/office/drawing/2014/main" id="{3DC5AF13-4604-48BF-96B2-3A1CFC30C20C}"/>
+              </a:ext>
+            </a:extLst>
+          </p:cNvPr>
+          <p:cNvCxnSpPr>
+            <a:cxnSpLocks/>
+          </p:cNvCxnSpPr>
+          <p:nvPr/>
+        </p:nvCxnSpPr>
+        <p:spPr>
+          <a:xfrm flipV="1">
+            <a:off x="6065203" y="2732353"/>
+            <a:ext cx="830717" cy="931068"/>
+          </a:xfrm>
+          <a:prstGeom prst="line">
+            <a:avLst/>
+          </a:prstGeom>
+          <a:ln>
+            <a:solidFill>
+              <a:schemeClr val="bg1">
+                <a:lumMod val="50000"/>
+              </a:schemeClr>
+            </a:solidFill>
+            <a:prstDash val="lgDashDot"/>
+          </a:ln>
+        </p:spPr>
+        <p:style>
+          <a:lnRef idx="1">
+            <a:schemeClr val="dk1"/>
+          </a:lnRef>
+          <a:fillRef idx="0">
+            <a:schemeClr val="dk1"/>
+          </a:fillRef>
+          <a:effectRef idx="0">
+            <a:schemeClr val="dk1"/>
+          </a:effectRef>
+          <a:fontRef idx="minor">
+            <a:schemeClr val="tx1"/>
+          </a:fontRef>
+        </p:style>
+      </p:cxnSp>
+      <p:cxnSp>
+        <p:nvCxnSpPr>
+          <p:cNvPr id="13" name="直接连接符 12">
+            <a:extLst>
+              <a:ext uri="{FF2B5EF4-FFF2-40B4-BE49-F238E27FC236}">
+                <a16:creationId xmlns:a16="http://schemas.microsoft.com/office/drawing/2014/main" id="{65BBB974-E86C-4CC0-954B-929C2ECA6370}"/>
+              </a:ext>
+            </a:extLst>
+          </p:cNvPr>
+          <p:cNvCxnSpPr>
+            <a:cxnSpLocks/>
+          </p:cNvCxnSpPr>
+          <p:nvPr/>
+        </p:nvCxnSpPr>
+        <p:spPr>
+          <a:xfrm>
+            <a:off x="7012430" y="2925445"/>
+            <a:ext cx="154906" cy="736600"/>
+          </a:xfrm>
+          <a:prstGeom prst="line">
+            <a:avLst/>
+          </a:prstGeom>
+          <a:ln>
+            <a:solidFill>
+              <a:schemeClr val="bg1">
+                <a:lumMod val="50000"/>
+              </a:schemeClr>
+            </a:solidFill>
+            <a:prstDash val="lgDashDot"/>
+          </a:ln>
+        </p:spPr>
+        <p:style>
+          <a:lnRef idx="1">
+            <a:schemeClr val="dk1"/>
+          </a:lnRef>
+          <a:fillRef idx="0">
+            <a:schemeClr val="dk1"/>
+          </a:fillRef>
+          <a:effectRef idx="0">
+            <a:schemeClr val="dk1"/>
+          </a:effectRef>
+          <a:fontRef idx="minor">
+            <a:schemeClr val="tx1"/>
+          </a:fontRef>
+        </p:style>
+      </p:cxnSp>
+      <p:sp>
+        <p:nvSpPr>
+          <p:cNvPr id="75" name="矩形 74">
+            <a:extLst>
+              <a:ext uri="{FF2B5EF4-FFF2-40B4-BE49-F238E27FC236}">
+                <a16:creationId xmlns:a16="http://schemas.microsoft.com/office/drawing/2014/main" id="{25A8C9AB-8A67-49D9-8A91-B4A7003B0EC3}"/>
+              </a:ext>
+            </a:extLst>
+          </p:cNvPr>
+          <p:cNvSpPr/>
+          <p:nvPr/>
+        </p:nvSpPr>
+        <p:spPr>
+          <a:xfrm>
+            <a:off x="3401482" y="1744980"/>
+            <a:ext cx="3954799" cy="3680460"/>
+          </a:xfrm>
+          <a:prstGeom prst="rect">
+            <a:avLst/>
+          </a:prstGeom>
+          <a:noFill/>
+          <a:ln>
+            <a:solidFill>
+              <a:schemeClr val="bg2">
+                <a:lumMod val="25000"/>
+              </a:schemeClr>
+            </a:solidFill>
+          </a:ln>
+        </p:spPr>
+        <p:style>
+          <a:lnRef idx="2">
+            <a:schemeClr val="accent1">
+              <a:shade val="50000"/>
+            </a:schemeClr>
+          </a:lnRef>
+          <a:fillRef idx="1">
+            <a:schemeClr val="accent1"/>
+          </a:fillRef>
+          <a:effectRef idx="0">
+            <a:schemeClr val="accent1"/>
+          </a:effectRef>
+          <a:fontRef idx="minor">
+            <a:schemeClr val="lt1"/>
+          </a:fontRef>
+        </p:style>
+        <p:txBody>
+          <a:bodyPr rtlCol="0" anchor="ctr"/>
+          <a:lstStyle/>
+          <a:p>
+            <a:pPr algn="ctr"/>
+            <a:endParaRPr lang="zh-CN" altLang="en-US"/>
+          </a:p>
+        </p:txBody>
+      </p:sp>
+      <p:cxnSp>
+        <p:nvCxnSpPr>
+          <p:cNvPr id="42" name="直接连接符 41">
+            <a:extLst>
+              <a:ext uri="{FF2B5EF4-FFF2-40B4-BE49-F238E27FC236}">
+                <a16:creationId xmlns:a16="http://schemas.microsoft.com/office/drawing/2014/main" id="{640A820C-7239-4EAC-85D5-003C6598E48C}"/>
+              </a:ext>
+            </a:extLst>
+          </p:cNvPr>
+          <p:cNvCxnSpPr>
+            <a:cxnSpLocks/>
+          </p:cNvCxnSpPr>
+          <p:nvPr/>
+        </p:nvCxnSpPr>
+        <p:spPr>
+          <a:xfrm flipH="1" flipV="1">
+            <a:off x="5608320" y="3824530"/>
+            <a:ext cx="701040" cy="374700"/>
+          </a:xfrm>
+          <a:prstGeom prst="line">
+            <a:avLst/>
+          </a:prstGeom>
+          <a:ln w="9525" cap="flat" cmpd="sng" algn="ctr">
+            <a:solidFill>
+              <a:schemeClr val="dk1"/>
+            </a:solidFill>
+            <a:prstDash val="solid"/>
+            <a:round/>
+            <a:headEnd type="none" w="med" len="med"/>
+            <a:tailEnd type="arrow" w="med" len="med"/>
+          </a:ln>
+        </p:spPr>
+        <p:style>
+          <a:lnRef idx="0">
+            <a:scrgbClr r="0" g="0" b="0"/>
+          </a:lnRef>
+          <a:fillRef idx="0">
+            <a:scrgbClr r="0" g="0" b="0"/>
+          </a:fillRef>
+          <a:effectRef idx="0">
+            <a:scrgbClr r="0" g="0" b="0"/>
+          </a:effectRef>
+          <a:fontRef idx="minor">
+            <a:schemeClr val="tx1"/>
+          </a:fontRef>
+        </p:style>
+      </p:cxnSp>
+    </p:spTree>
+    <p:extLst>
+      <p:ext uri="{BB962C8B-B14F-4D97-AF65-F5344CB8AC3E}">
+        <p14:creationId xmlns:p14="http://schemas.microsoft.com/office/powerpoint/2010/main" val="2836170125"/>
+      </p:ext>
+    </p:extLst>
+  </p:cSld>
+  <p:clrMapOvr>
+    <a:masterClrMapping/>
+  </p:clrMapOvr>
+</p:sld>
+</file>
+
 <file path=ppt/slides/slide3.xml><?xml version="1.0" encoding="utf-8"?>
+<p:sld xmlns:a="http://schemas.openxmlformats.org/drawingml/2006/main" xmlns:r="http://schemas.openxmlformats.org/officeDocument/2006/relationships" xmlns:p="http://schemas.openxmlformats.org/presentationml/2006/main">
+  <p:cSld>
+    <p:spTree>
+      <p:nvGrpSpPr>
+        <p:cNvPr id="1" name=""/>
+        <p:cNvGrpSpPr/>
+        <p:nvPr/>
+      </p:nvGrpSpPr>
+      <p:grpSpPr>
+        <a:xfrm>
+          <a:off x="0" y="0"/>
+          <a:ext cx="0" cy="0"/>
+          <a:chOff x="0" y="0"/>
+          <a:chExt cx="0" cy="0"/>
+        </a:xfrm>
+      </p:grpSpPr>
+      <p:sp>
+        <p:nvSpPr>
+          <p:cNvPr id="2" name="圆角矩形 1"/>
+          <p:cNvSpPr/>
+          <p:nvPr/>
+        </p:nvSpPr>
+        <p:spPr>
+          <a:xfrm>
+            <a:off x="3469715" y="224444"/>
+            <a:ext cx="4142738" cy="6384175"/>
+          </a:xfrm>
+          <a:prstGeom prst="roundRect">
+            <a:avLst/>
+          </a:prstGeom>
+          <a:solidFill>
+            <a:schemeClr val="accent2">
+              <a:lumMod val="20000"/>
+              <a:lumOff val="80000"/>
+            </a:schemeClr>
+          </a:solidFill>
+          <a:ln>
+            <a:noFill/>
+          </a:ln>
+        </p:spPr>
+        <p:style>
+          <a:lnRef idx="2">
+            <a:schemeClr val="accent1">
+              <a:shade val="50000"/>
+            </a:schemeClr>
+          </a:lnRef>
+          <a:fillRef idx="1">
+            <a:schemeClr val="accent1"/>
+          </a:fillRef>
+          <a:effectRef idx="0">
+            <a:schemeClr val="accent1"/>
+          </a:effectRef>
+          <a:fontRef idx="minor">
+            <a:schemeClr val="lt1"/>
+          </a:fontRef>
+        </p:style>
+        <p:txBody>
+          <a:bodyPr rtlCol="0" anchor="ctr"/>
+          <a:lstStyle/>
+          <a:p>
+            <a:pPr algn="ctr"/>
+            <a:endParaRPr lang="zh-CN" altLang="en-US"/>
+          </a:p>
+        </p:txBody>
+      </p:sp>
+      <p:sp>
+        <p:nvSpPr>
+          <p:cNvPr id="4" name="文本框 3"/>
+          <p:cNvSpPr txBox="1"/>
+          <p:nvPr/>
+        </p:nvSpPr>
+        <p:spPr>
+          <a:xfrm>
+            <a:off x="1119676" y="732925"/>
+            <a:ext cx="2659360" cy="646331"/>
+          </a:xfrm>
+          <a:prstGeom prst="rect">
+            <a:avLst/>
+          </a:prstGeom>
+          <a:solidFill>
+            <a:schemeClr val="accent1">
+              <a:lumMod val="20000"/>
+              <a:lumOff val="80000"/>
+            </a:schemeClr>
+          </a:solidFill>
+        </p:spPr>
+        <p:txBody>
+          <a:bodyPr wrap="square" rtlCol="0">
+            <a:spAutoFit/>
+          </a:bodyPr>
+          <a:lstStyle/>
+          <a:p>
+            <a:pPr algn="ctr"/>
+            <a:r>
+              <a:rPr lang="en-US" altLang="zh-CN" dirty="0"/>
+              <a:t>Focus on decision relevance</a:t>
+            </a:r>
+            <a:endParaRPr lang="zh-CN" altLang="en-US" dirty="0"/>
+          </a:p>
+        </p:txBody>
+      </p:sp>
+      <p:sp>
+        <p:nvSpPr>
+          <p:cNvPr id="5" name="文本框 4"/>
+          <p:cNvSpPr txBox="1"/>
+          <p:nvPr/>
+        </p:nvSpPr>
+        <p:spPr>
+          <a:xfrm>
+            <a:off x="1112400" y="1994823"/>
+            <a:ext cx="2570562" cy="369332"/>
+          </a:xfrm>
+          <a:prstGeom prst="rect">
+            <a:avLst/>
+          </a:prstGeom>
+          <a:solidFill>
+            <a:schemeClr val="accent1">
+              <a:lumMod val="20000"/>
+              <a:lumOff val="80000"/>
+            </a:schemeClr>
+          </a:solidFill>
+        </p:spPr>
+        <p:txBody>
+          <a:bodyPr wrap="square" rtlCol="0">
+            <a:spAutoFit/>
+          </a:bodyPr>
+          <a:lstStyle/>
+          <a:p>
+            <a:pPr algn="ctr"/>
+            <a:r>
+              <a:rPr lang="en-US" altLang="zh-CN" dirty="0"/>
+              <a:t>Re-parameterize first</a:t>
+            </a:r>
+            <a:endParaRPr lang="zh-CN" altLang="en-US" dirty="0"/>
+          </a:p>
+        </p:txBody>
+      </p:sp>
+      <p:sp>
+        <p:nvSpPr>
+          <p:cNvPr id="6" name="文本框 5"/>
+          <p:cNvSpPr txBox="1"/>
+          <p:nvPr/>
+        </p:nvSpPr>
+        <p:spPr>
+          <a:xfrm>
+            <a:off x="1058929" y="3606735"/>
+            <a:ext cx="2637597" cy="923330"/>
+          </a:xfrm>
+          <a:prstGeom prst="rect">
+            <a:avLst/>
+          </a:prstGeom>
+          <a:solidFill>
+            <a:schemeClr val="accent1">
+              <a:lumMod val="20000"/>
+              <a:lumOff val="80000"/>
+            </a:schemeClr>
+          </a:solidFill>
+        </p:spPr>
+        <p:txBody>
+          <a:bodyPr wrap="square" rtlCol="0">
+            <a:spAutoFit/>
+          </a:bodyPr>
+          <a:lstStyle/>
+          <a:p>
+            <a:pPr algn="ctr"/>
+            <a:r>
+              <a:rPr lang="en-US" altLang="zh-CN" dirty="0"/>
+              <a:t>Conduct adaptive evaluation and robustness assessment</a:t>
+            </a:r>
+            <a:endParaRPr lang="zh-CN" altLang="en-US" dirty="0"/>
+          </a:p>
+        </p:txBody>
+      </p:sp>
+      <p:sp>
+        <p:nvSpPr>
+          <p:cNvPr id="7" name="文本框 6"/>
+          <p:cNvSpPr txBox="1"/>
+          <p:nvPr/>
+        </p:nvSpPr>
+        <p:spPr>
+          <a:xfrm>
+            <a:off x="1093734" y="5514710"/>
+            <a:ext cx="2637597" cy="646331"/>
+          </a:xfrm>
+          <a:prstGeom prst="rect">
+            <a:avLst/>
+          </a:prstGeom>
+          <a:solidFill>
+            <a:schemeClr val="accent1">
+              <a:lumMod val="20000"/>
+              <a:lumOff val="80000"/>
+            </a:schemeClr>
+          </a:solidFill>
+        </p:spPr>
+        <p:txBody>
+          <a:bodyPr wrap="square" rtlCol="0">
+            <a:spAutoFit/>
+          </a:bodyPr>
+          <a:lstStyle/>
+          <a:p>
+            <a:pPr algn="ctr"/>
+            <a:r>
+              <a:rPr lang="en-US" altLang="zh-CN" dirty="0"/>
+              <a:t>Reconsider whether fixing is necessary</a:t>
+            </a:r>
+            <a:endParaRPr lang="zh-CN" altLang="en-US" dirty="0"/>
+          </a:p>
+        </p:txBody>
+      </p:sp>
+      <p:sp>
+        <p:nvSpPr>
+          <p:cNvPr id="11" name="文本框 10"/>
+          <p:cNvSpPr txBox="1"/>
+          <p:nvPr/>
+        </p:nvSpPr>
+        <p:spPr>
+          <a:xfrm>
+            <a:off x="3686738" y="413493"/>
+            <a:ext cx="3708693" cy="1231106"/>
+          </a:xfrm>
+          <a:prstGeom prst="rect">
+            <a:avLst/>
+          </a:prstGeom>
+          <a:solidFill>
+            <a:schemeClr val="bg1">
+              <a:lumMod val="95000"/>
+            </a:schemeClr>
+          </a:solidFill>
+        </p:spPr>
+        <p:txBody>
+          <a:bodyPr wrap="square" rtlCol="0">
+            <a:spAutoFit/>
+          </a:bodyPr>
+          <a:lstStyle/>
+          <a:p>
+            <a:pPr algn="ctr"/>
+            <a:r>
+              <a:rPr lang="en-US" altLang="zh-CN" dirty="0"/>
+              <a:t>Experiment plan</a:t>
+            </a:r>
+          </a:p>
+          <a:p>
+            <a:pPr marL="285750" indent="-285750">
+              <a:buFont typeface="Arial" panose="020B0604020202020204" pitchFamily="34" charset="0"/>
+              <a:buChar char="•"/>
+            </a:pPr>
+            <a:r>
+              <a:rPr lang="en-US" altLang="zh-CN" sz="1400" dirty="0"/>
+              <a:t>Fix parameters at average values of parameter distributions</a:t>
+            </a:r>
+          </a:p>
+          <a:p>
+            <a:pPr marL="285750" indent="-285750">
+              <a:buFont typeface="Arial" panose="020B0604020202020204" pitchFamily="34" charset="0"/>
+              <a:buChar char="•"/>
+            </a:pPr>
+            <a:r>
+              <a:rPr lang="en-US" altLang="zh-CN" sz="1400" dirty="0"/>
+              <a:t>Potential options of error measures used for measuring uncertainty</a:t>
+            </a:r>
+          </a:p>
+        </p:txBody>
+      </p:sp>
+      <p:sp>
+        <p:nvSpPr>
+          <p:cNvPr id="28" name="文本框 27"/>
+          <p:cNvSpPr txBox="1"/>
+          <p:nvPr/>
+        </p:nvSpPr>
+        <p:spPr>
+          <a:xfrm>
+            <a:off x="3686738" y="1781694"/>
+            <a:ext cx="3708693" cy="738664"/>
+          </a:xfrm>
+          <a:prstGeom prst="rect">
+            <a:avLst/>
+          </a:prstGeom>
+          <a:solidFill>
+            <a:schemeClr val="bg1">
+              <a:lumMod val="95000"/>
+            </a:schemeClr>
+          </a:solidFill>
+        </p:spPr>
+        <p:txBody>
+          <a:bodyPr wrap="square" rtlCol="0">
+            <a:spAutoFit/>
+          </a:bodyPr>
+          <a:lstStyle/>
+          <a:p>
+            <a:pPr marL="285750" indent="-285750">
+              <a:buFont typeface="Arial" panose="020B0604020202020204" pitchFamily="34" charset="0"/>
+              <a:buChar char="•"/>
+            </a:pPr>
+            <a:r>
+              <a:rPr lang="en-US" altLang="zh-CN" sz="1400" dirty="0"/>
+              <a:t>Identify multiplicative parameter interactions</a:t>
+            </a:r>
+          </a:p>
+          <a:p>
+            <a:pPr marL="285750" indent="-285750">
+              <a:buFont typeface="Arial" panose="020B0604020202020204" pitchFamily="34" charset="0"/>
+              <a:buChar char="•"/>
+            </a:pPr>
+            <a:r>
+              <a:rPr lang="en-US" altLang="zh-CN" sz="1400" dirty="0"/>
+              <a:t>Adjust parameter ranges and distributions</a:t>
+            </a:r>
+          </a:p>
+        </p:txBody>
+      </p:sp>
+      <p:sp>
+        <p:nvSpPr>
+          <p:cNvPr id="29" name="文本框 28"/>
+          <p:cNvSpPr txBox="1"/>
+          <p:nvPr/>
+        </p:nvSpPr>
+        <p:spPr>
+          <a:xfrm>
+            <a:off x="3698815" y="3297256"/>
+            <a:ext cx="3684539" cy="1661993"/>
+          </a:xfrm>
+          <a:prstGeom prst="rect">
+            <a:avLst/>
+          </a:prstGeom>
+          <a:solidFill>
+            <a:schemeClr val="bg1">
+              <a:lumMod val="95000"/>
+            </a:schemeClr>
+          </a:solidFill>
+        </p:spPr>
+        <p:txBody>
+          <a:bodyPr wrap="square" rtlCol="0">
+            <a:spAutoFit/>
+          </a:bodyPr>
+          <a:lstStyle/>
+          <a:p>
+            <a:pPr algn="ctr"/>
+            <a:r>
+              <a:rPr lang="en-US" altLang="zh-CN" dirty="0"/>
+              <a:t>Adaptive FF</a:t>
+            </a:r>
+          </a:p>
+          <a:p>
+            <a:pPr marL="285750" indent="-285750">
+              <a:buFont typeface="Arial" panose="020B0604020202020204" pitchFamily="34" charset="0"/>
+              <a:buChar char="•"/>
+            </a:pPr>
+            <a:r>
+              <a:rPr lang="en-US" altLang="zh-CN" sz="1400" dirty="0"/>
+              <a:t>Adaptive PCE based GSA and uncertainty-based parameter ranking</a:t>
+            </a:r>
+          </a:p>
+          <a:p>
+            <a:pPr marL="285750" indent="-285750">
+              <a:buFont typeface="Arial" panose="020B0604020202020204" pitchFamily="34" charset="0"/>
+              <a:buChar char="•"/>
+            </a:pPr>
+            <a:r>
+              <a:rPr lang="en-US" altLang="zh-CN" sz="1400" dirty="0"/>
+              <a:t>Approximate the error with a small sample size</a:t>
+            </a:r>
+          </a:p>
+          <a:p>
+            <a:pPr marL="285750" indent="-285750">
+              <a:buFont typeface="Arial" panose="020B0604020202020204" pitchFamily="34" charset="0"/>
+              <a:buChar char="•"/>
+            </a:pPr>
+            <a:r>
+              <a:rPr lang="en-US" altLang="zh-CN" sz="1400" dirty="0"/>
+              <a:t>Identify important parameters for varying and potential parameters to fix</a:t>
+            </a:r>
+          </a:p>
+        </p:txBody>
+      </p:sp>
+      <p:sp>
+        <p:nvSpPr>
+          <p:cNvPr id="30" name="文本框 29"/>
+          <p:cNvSpPr txBox="1"/>
+          <p:nvPr/>
+        </p:nvSpPr>
+        <p:spPr>
+          <a:xfrm>
+            <a:off x="3698815" y="5089322"/>
+            <a:ext cx="3684539" cy="1292662"/>
+          </a:xfrm>
+          <a:prstGeom prst="rect">
+            <a:avLst/>
+          </a:prstGeom>
+          <a:solidFill>
+            <a:schemeClr val="bg1">
+              <a:lumMod val="95000"/>
+            </a:schemeClr>
+          </a:solidFill>
+        </p:spPr>
+        <p:txBody>
+          <a:bodyPr wrap="square" rtlCol="0">
+            <a:spAutoFit/>
+          </a:bodyPr>
+          <a:lstStyle/>
+          <a:p>
+            <a:pPr algn="ctr"/>
+            <a:r>
+              <a:rPr lang="en-US" altLang="zh-CN" dirty="0"/>
+              <a:t> Robustness analysis of error measures</a:t>
+            </a:r>
+          </a:p>
+          <a:p>
+            <a:pPr marL="285750" indent="-285750">
+              <a:buFont typeface="Arial" panose="020B0604020202020204" pitchFamily="34" charset="0"/>
+              <a:buChar char="•"/>
+            </a:pPr>
+            <a:r>
+              <a:rPr lang="en-US" altLang="zh-CN" sz="1400" dirty="0"/>
+              <a:t>Increase sample size to assess the reliability of results</a:t>
+            </a:r>
+          </a:p>
+          <a:p>
+            <a:pPr marL="285750" indent="-285750">
+              <a:buFont typeface="Arial" panose="020B0604020202020204" pitchFamily="34" charset="0"/>
+              <a:buChar char="•"/>
+            </a:pPr>
+            <a:r>
+              <a:rPr lang="en-US" altLang="zh-CN" sz="1400" dirty="0"/>
+              <a:t>Reflection on FF and the next step</a:t>
+            </a:r>
+          </a:p>
+        </p:txBody>
+      </p:sp>
+      <p:sp>
+        <p:nvSpPr>
+          <p:cNvPr id="35" name="下弧形箭头 34"/>
+          <p:cNvSpPr/>
+          <p:nvPr/>
+        </p:nvSpPr>
+        <p:spPr>
+          <a:xfrm rot="16200000">
+            <a:off x="6742475" y="4153658"/>
+            <a:ext cx="1219483" cy="291376"/>
+          </a:xfrm>
+          <a:prstGeom prst="curvedUpArrow">
+            <a:avLst/>
+          </a:prstGeom>
+        </p:spPr>
+        <p:style>
+          <a:lnRef idx="2">
+            <a:schemeClr val="accent1">
+              <a:shade val="50000"/>
+            </a:schemeClr>
+          </a:lnRef>
+          <a:fillRef idx="1">
+            <a:schemeClr val="accent1"/>
+          </a:fillRef>
+          <a:effectRef idx="0">
+            <a:schemeClr val="accent1"/>
+          </a:effectRef>
+          <a:fontRef idx="minor">
+            <a:schemeClr val="lt1"/>
+          </a:fontRef>
+        </p:style>
+        <p:txBody>
+          <a:bodyPr rtlCol="0" anchor="ctr"/>
+          <a:lstStyle/>
+          <a:p>
+            <a:pPr algn="ctr"/>
+            <a:endParaRPr lang="zh-CN" altLang="en-US">
+              <a:solidFill>
+                <a:schemeClr val="tx1"/>
+              </a:solidFill>
+            </a:endParaRPr>
+          </a:p>
+        </p:txBody>
+      </p:sp>
+      <p:sp>
+        <p:nvSpPr>
+          <p:cNvPr id="37" name="左弧形箭头 36"/>
+          <p:cNvSpPr/>
+          <p:nvPr/>
+        </p:nvSpPr>
+        <p:spPr>
+          <a:xfrm flipV="1">
+            <a:off x="436957" y="1034257"/>
+            <a:ext cx="667679" cy="4701396"/>
+          </a:xfrm>
+          <a:prstGeom prst="curvedRightArrow">
+            <a:avLst/>
+          </a:prstGeom>
+        </p:spPr>
+        <p:style>
+          <a:lnRef idx="2">
+            <a:schemeClr val="accent1">
+              <a:shade val="50000"/>
+            </a:schemeClr>
+          </a:lnRef>
+          <a:fillRef idx="1">
+            <a:schemeClr val="accent1"/>
+          </a:fillRef>
+          <a:effectRef idx="0">
+            <a:schemeClr val="accent1"/>
+          </a:effectRef>
+          <a:fontRef idx="minor">
+            <a:schemeClr val="lt1"/>
+          </a:fontRef>
+        </p:style>
+        <p:txBody>
+          <a:bodyPr rtlCol="0" anchor="ctr"/>
+          <a:lstStyle/>
+          <a:p>
+            <a:pPr algn="ctr"/>
+            <a:endParaRPr lang="zh-CN" altLang="en-US">
+              <a:solidFill>
+                <a:schemeClr val="tx1"/>
+              </a:solidFill>
+            </a:endParaRPr>
+          </a:p>
+        </p:txBody>
+      </p:sp>
+      <p:sp>
+        <p:nvSpPr>
+          <p:cNvPr id="18" name="文本框 17"/>
+          <p:cNvSpPr txBox="1"/>
+          <p:nvPr/>
+        </p:nvSpPr>
+        <p:spPr>
+          <a:xfrm>
+            <a:off x="3686738" y="2658127"/>
+            <a:ext cx="3708693" cy="523220"/>
+          </a:xfrm>
+          <a:prstGeom prst="rect">
+            <a:avLst/>
+          </a:prstGeom>
+          <a:solidFill>
+            <a:schemeClr val="bg1">
+              <a:lumMod val="95000"/>
+            </a:schemeClr>
+          </a:solidFill>
+        </p:spPr>
+        <p:txBody>
+          <a:bodyPr wrap="square" rtlCol="0">
+            <a:spAutoFit/>
+          </a:bodyPr>
+          <a:lstStyle/>
+          <a:p>
+            <a:pPr marL="285750" indent="-285750">
+              <a:buFont typeface="Arial" panose="020B0604020202020204" pitchFamily="34" charset="0"/>
+              <a:buChar char="•"/>
+            </a:pPr>
+            <a:r>
+              <a:rPr lang="en-US" altLang="zh-CN" sz="1400" dirty="0"/>
+              <a:t>Run the model to generate samples for calibrating PCE</a:t>
+            </a:r>
+          </a:p>
+        </p:txBody>
+      </p:sp>
+      <p:sp>
+        <p:nvSpPr>
+          <p:cNvPr id="10" name="下箭头 9"/>
+          <p:cNvSpPr/>
+          <p:nvPr/>
+        </p:nvSpPr>
+        <p:spPr>
+          <a:xfrm>
+            <a:off x="5461081" y="1672750"/>
+            <a:ext cx="160006" cy="113061"/>
+          </a:xfrm>
+          <a:prstGeom prst="downArrow">
+            <a:avLst/>
+          </a:prstGeom>
+        </p:spPr>
+        <p:style>
+          <a:lnRef idx="2">
+            <a:schemeClr val="accent1">
+              <a:shade val="50000"/>
+            </a:schemeClr>
+          </a:lnRef>
+          <a:fillRef idx="1">
+            <a:schemeClr val="accent1"/>
+          </a:fillRef>
+          <a:effectRef idx="0">
+            <a:schemeClr val="accent1"/>
+          </a:effectRef>
+          <a:fontRef idx="minor">
+            <a:schemeClr val="lt1"/>
+          </a:fontRef>
+        </p:style>
+        <p:txBody>
+          <a:bodyPr rtlCol="0" anchor="ctr"/>
+          <a:lstStyle/>
+          <a:p>
+            <a:pPr algn="ctr"/>
+            <a:endParaRPr lang="zh-CN" altLang="en-US" dirty="0"/>
+          </a:p>
+        </p:txBody>
+      </p:sp>
+      <p:sp>
+        <p:nvSpPr>
+          <p:cNvPr id="21" name="下箭头 20"/>
+          <p:cNvSpPr/>
+          <p:nvPr/>
+        </p:nvSpPr>
+        <p:spPr>
+          <a:xfrm>
+            <a:off x="5461081" y="2537932"/>
+            <a:ext cx="160006" cy="113061"/>
+          </a:xfrm>
+          <a:prstGeom prst="downArrow">
+            <a:avLst/>
+          </a:prstGeom>
+        </p:spPr>
+        <p:style>
+          <a:lnRef idx="2">
+            <a:schemeClr val="accent1">
+              <a:shade val="50000"/>
+            </a:schemeClr>
+          </a:lnRef>
+          <a:fillRef idx="1">
+            <a:schemeClr val="accent1"/>
+          </a:fillRef>
+          <a:effectRef idx="0">
+            <a:schemeClr val="accent1"/>
+          </a:effectRef>
+          <a:fontRef idx="minor">
+            <a:schemeClr val="lt1"/>
+          </a:fontRef>
+        </p:style>
+        <p:txBody>
+          <a:bodyPr rtlCol="0" anchor="ctr"/>
+          <a:lstStyle/>
+          <a:p>
+            <a:pPr algn="ctr"/>
+            <a:endParaRPr lang="zh-CN" altLang="en-US"/>
+          </a:p>
+        </p:txBody>
+      </p:sp>
+      <p:sp>
+        <p:nvSpPr>
+          <p:cNvPr id="22" name="下箭头 21"/>
+          <p:cNvSpPr/>
+          <p:nvPr/>
+        </p:nvSpPr>
+        <p:spPr>
+          <a:xfrm>
+            <a:off x="5461081" y="3177445"/>
+            <a:ext cx="160006" cy="113061"/>
+          </a:xfrm>
+          <a:prstGeom prst="downArrow">
+            <a:avLst/>
+          </a:prstGeom>
+        </p:spPr>
+        <p:style>
+          <a:lnRef idx="2">
+            <a:schemeClr val="accent1">
+              <a:shade val="50000"/>
+            </a:schemeClr>
+          </a:lnRef>
+          <a:fillRef idx="1">
+            <a:schemeClr val="accent1"/>
+          </a:fillRef>
+          <a:effectRef idx="0">
+            <a:schemeClr val="accent1"/>
+          </a:effectRef>
+          <a:fontRef idx="minor">
+            <a:schemeClr val="lt1"/>
+          </a:fontRef>
+        </p:style>
+        <p:txBody>
+          <a:bodyPr rtlCol="0" anchor="ctr"/>
+          <a:lstStyle/>
+          <a:p>
+            <a:pPr algn="ctr"/>
+            <a:endParaRPr lang="zh-CN" altLang="en-US"/>
+          </a:p>
+        </p:txBody>
+      </p:sp>
+      <p:sp>
+        <p:nvSpPr>
+          <p:cNvPr id="23" name="下箭头 22"/>
+          <p:cNvSpPr/>
+          <p:nvPr/>
+        </p:nvSpPr>
+        <p:spPr>
+          <a:xfrm>
+            <a:off x="5461081" y="4964537"/>
+            <a:ext cx="160006" cy="113061"/>
+          </a:xfrm>
+          <a:prstGeom prst="downArrow">
+            <a:avLst/>
+          </a:prstGeom>
+        </p:spPr>
+        <p:style>
+          <a:lnRef idx="2">
+            <a:schemeClr val="accent1">
+              <a:shade val="50000"/>
+            </a:schemeClr>
+          </a:lnRef>
+          <a:fillRef idx="1">
+            <a:schemeClr val="accent1"/>
+          </a:fillRef>
+          <a:effectRef idx="0">
+            <a:schemeClr val="accent1"/>
+          </a:effectRef>
+          <a:fontRef idx="minor">
+            <a:schemeClr val="lt1"/>
+          </a:fontRef>
+        </p:style>
+        <p:txBody>
+          <a:bodyPr rtlCol="0" anchor="ctr"/>
+          <a:lstStyle/>
+          <a:p>
+            <a:pPr algn="ctr"/>
+            <a:endParaRPr lang="zh-CN" altLang="en-US"/>
+          </a:p>
+        </p:txBody>
+      </p:sp>
+      <p:sp>
+        <p:nvSpPr>
+          <p:cNvPr id="3" name="文本框 2"/>
+          <p:cNvSpPr txBox="1"/>
+          <p:nvPr/>
+        </p:nvSpPr>
+        <p:spPr>
+          <a:xfrm>
+            <a:off x="7612453" y="2093263"/>
+            <a:ext cx="4004814" cy="523220"/>
+          </a:xfrm>
+          <a:prstGeom prst="rect">
+            <a:avLst/>
+          </a:prstGeom>
+          <a:noFill/>
+        </p:spPr>
+        <p:txBody>
+          <a:bodyPr wrap="none" rtlCol="0">
+            <a:spAutoFit/>
+          </a:bodyPr>
+          <a:lstStyle/>
+          <a:p>
+            <a:pPr marL="285750" indent="-285750">
+              <a:buFont typeface="Wingdings" panose="05000000000000000000" pitchFamily="2" charset="2"/>
+              <a:buChar char="q"/>
+            </a:pPr>
+            <a:r>
+              <a:rPr lang="en-US" altLang="zh-CN" sz="1400" dirty="0"/>
+              <a:t>Section 5.1</a:t>
+            </a:r>
+          </a:p>
+          <a:p>
+            <a:r>
+              <a:rPr lang="en-US" altLang="zh-CN" sz="1400" dirty="0"/>
+              <a:t>PCE validation with effect of parameter distributions</a:t>
+            </a:r>
+          </a:p>
+        </p:txBody>
+      </p:sp>
+      <p:sp>
+        <p:nvSpPr>
+          <p:cNvPr id="8" name="文本框 7"/>
+          <p:cNvSpPr txBox="1"/>
+          <p:nvPr/>
+        </p:nvSpPr>
+        <p:spPr>
+          <a:xfrm>
+            <a:off x="7612452" y="2591372"/>
+            <a:ext cx="4161717" cy="523220"/>
+          </a:xfrm>
+          <a:prstGeom prst="rect">
+            <a:avLst/>
+          </a:prstGeom>
+          <a:noFill/>
+        </p:spPr>
+        <p:txBody>
+          <a:bodyPr wrap="none" rtlCol="0">
+            <a:spAutoFit/>
+          </a:bodyPr>
+          <a:lstStyle/>
+          <a:p>
+            <a:pPr marL="285750" indent="-285750">
+              <a:buFont typeface="Wingdings" panose="05000000000000000000" pitchFamily="2" charset="2"/>
+              <a:buChar char="q"/>
+            </a:pPr>
+            <a:r>
+              <a:rPr lang="en-US" altLang="zh-CN" sz="1400" dirty="0"/>
+              <a:t>Section 5.2</a:t>
+            </a:r>
+          </a:p>
+          <a:p>
+            <a:r>
+              <a:rPr lang="en-US" altLang="zh-CN" sz="1400" dirty="0"/>
+              <a:t>Impact of parameter distributions on sensitivity index</a:t>
+            </a:r>
+            <a:endParaRPr lang="zh-CN" altLang="en-US" sz="1400" dirty="0"/>
+          </a:p>
+        </p:txBody>
+      </p:sp>
+      <p:sp>
+        <p:nvSpPr>
+          <p:cNvPr id="9" name="文本框 8"/>
+          <p:cNvSpPr txBox="1"/>
+          <p:nvPr/>
+        </p:nvSpPr>
+        <p:spPr>
+          <a:xfrm>
+            <a:off x="7617030" y="3876213"/>
+            <a:ext cx="3812969" cy="738664"/>
+          </a:xfrm>
+          <a:prstGeom prst="rect">
+            <a:avLst/>
+          </a:prstGeom>
+          <a:noFill/>
+        </p:spPr>
+        <p:txBody>
+          <a:bodyPr wrap="square" rtlCol="0">
+            <a:spAutoFit/>
+          </a:bodyPr>
+          <a:lstStyle/>
+          <a:p>
+            <a:pPr marL="285750" indent="-285750">
+              <a:buFont typeface="Wingdings" panose="05000000000000000000" pitchFamily="2" charset="2"/>
+              <a:buChar char="q"/>
+            </a:pPr>
+            <a:r>
+              <a:rPr lang="en-US" altLang="zh-CN" sz="1400" dirty="0"/>
+              <a:t>Section 5.3</a:t>
+            </a:r>
+          </a:p>
+          <a:p>
+            <a:r>
+              <a:rPr lang="en-US" altLang="zh-CN" sz="1400" dirty="0"/>
+              <a:t>Adaptive figure, approximation of error, and the decision on sample size</a:t>
+            </a:r>
+          </a:p>
+        </p:txBody>
+      </p:sp>
+      <p:sp>
+        <p:nvSpPr>
+          <p:cNvPr id="12" name="文本框 11"/>
+          <p:cNvSpPr txBox="1"/>
+          <p:nvPr/>
+        </p:nvSpPr>
+        <p:spPr>
+          <a:xfrm>
+            <a:off x="7612453" y="5397100"/>
+            <a:ext cx="2839752" cy="738664"/>
+          </a:xfrm>
+          <a:prstGeom prst="rect">
+            <a:avLst/>
+          </a:prstGeom>
+          <a:noFill/>
+        </p:spPr>
+        <p:txBody>
+          <a:bodyPr wrap="none" rtlCol="0">
+            <a:spAutoFit/>
+          </a:bodyPr>
+          <a:lstStyle/>
+          <a:p>
+            <a:pPr marL="285750" indent="-285750">
+              <a:buFont typeface="Wingdings" panose="05000000000000000000" pitchFamily="2" charset="2"/>
+              <a:buChar char="q"/>
+            </a:pPr>
+            <a:r>
+              <a:rPr lang="en-US" altLang="zh-CN" sz="1400" dirty="0"/>
+              <a:t>Sections 5.4 &amp; 5.5</a:t>
+            </a:r>
+          </a:p>
+          <a:p>
+            <a:r>
+              <a:rPr lang="en-US" altLang="zh-CN" sz="1400" dirty="0"/>
+              <a:t>Effect</a:t>
+            </a:r>
+            <a:r>
+              <a:rPr lang="zh-CN" altLang="en-US" sz="1400" dirty="0"/>
+              <a:t> </a:t>
+            </a:r>
+            <a:r>
+              <a:rPr lang="en-US" altLang="zh-CN" sz="1400" dirty="0"/>
+              <a:t>of uncertainty communication</a:t>
+            </a:r>
+          </a:p>
+          <a:p>
+            <a:r>
+              <a:rPr lang="en-US" altLang="zh-CN" sz="1400" dirty="0"/>
+              <a:t>Robustness assessment</a:t>
+            </a:r>
+            <a:endParaRPr lang="zh-CN" altLang="en-US" sz="1400" dirty="0"/>
+          </a:p>
+        </p:txBody>
+      </p:sp>
+      <p:sp>
+        <p:nvSpPr>
+          <p:cNvPr id="26" name="文本框 25"/>
+          <p:cNvSpPr txBox="1"/>
+          <p:nvPr/>
+        </p:nvSpPr>
+        <p:spPr>
+          <a:xfrm>
+            <a:off x="1444667" y="4477098"/>
+            <a:ext cx="2132315" cy="307777"/>
+          </a:xfrm>
+          <a:prstGeom prst="rect">
+            <a:avLst/>
+          </a:prstGeom>
+          <a:noFill/>
+        </p:spPr>
+        <p:txBody>
+          <a:bodyPr wrap="none" rtlCol="0">
+            <a:spAutoFit/>
+          </a:bodyPr>
+          <a:lstStyle/>
+          <a:p>
+            <a:pPr marL="285750" indent="-285750">
+              <a:buFont typeface="Wingdings" panose="05000000000000000000" pitchFamily="2" charset="2"/>
+              <a:buChar char="q"/>
+            </a:pPr>
+            <a:r>
+              <a:rPr lang="en-US" altLang="zh-CN" sz="1400" dirty="0"/>
+              <a:t>Discussion: Section 6.1</a:t>
+            </a:r>
+            <a:endParaRPr lang="zh-CN" altLang="en-US" sz="1400" dirty="0"/>
+          </a:p>
+        </p:txBody>
+      </p:sp>
+      <p:sp>
+        <p:nvSpPr>
+          <p:cNvPr id="14" name="TextBox 13"/>
+          <p:cNvSpPr txBox="1"/>
+          <p:nvPr/>
+        </p:nvSpPr>
+        <p:spPr>
+          <a:xfrm>
+            <a:off x="7711658" y="1732244"/>
+            <a:ext cx="1575933" cy="369332"/>
+          </a:xfrm>
+          <a:prstGeom prst="rect">
+            <a:avLst/>
+          </a:prstGeom>
+          <a:solidFill>
+            <a:schemeClr val="bg2">
+              <a:lumMod val="90000"/>
+            </a:schemeClr>
+          </a:solidFill>
+        </p:spPr>
+        <p:txBody>
+          <a:bodyPr wrap="square" rtlCol="0">
+            <a:spAutoFit/>
+          </a:bodyPr>
+          <a:lstStyle/>
+          <a:p>
+            <a:pPr algn="ctr"/>
+            <a:r>
+              <a:rPr lang="en-US" dirty="0"/>
+              <a:t>Results</a:t>
+            </a:r>
+            <a:endParaRPr lang="en-AU" dirty="0"/>
+          </a:p>
+        </p:txBody>
+      </p:sp>
+      <p:sp>
+        <p:nvSpPr>
+          <p:cNvPr id="34" name="Rounded Rectangle 33"/>
+          <p:cNvSpPr/>
+          <p:nvPr/>
+        </p:nvSpPr>
+        <p:spPr>
+          <a:xfrm>
+            <a:off x="7605034" y="2109518"/>
+            <a:ext cx="3997569" cy="1082949"/>
+          </a:xfrm>
+          <a:prstGeom prst="roundRect">
+            <a:avLst/>
+          </a:prstGeom>
+          <a:noFill/>
+          <a:ln>
+            <a:solidFill>
+              <a:schemeClr val="bg2">
+                <a:lumMod val="50000"/>
+              </a:schemeClr>
+            </a:solidFill>
+          </a:ln>
+        </p:spPr>
+        <p:style>
+          <a:lnRef idx="2">
+            <a:schemeClr val="accent1">
+              <a:shade val="50000"/>
+            </a:schemeClr>
+          </a:lnRef>
+          <a:fillRef idx="1">
+            <a:schemeClr val="accent1"/>
+          </a:fillRef>
+          <a:effectRef idx="0">
+            <a:schemeClr val="accent1"/>
+          </a:effectRef>
+          <a:fontRef idx="minor">
+            <a:schemeClr val="lt1"/>
+          </a:fontRef>
+        </p:style>
+        <p:txBody>
+          <a:bodyPr rtlCol="0" anchor="ctr"/>
+          <a:lstStyle/>
+          <a:p>
+            <a:pPr algn="ctr"/>
+            <a:endParaRPr lang="en-AU"/>
+          </a:p>
+        </p:txBody>
+      </p:sp>
+      <p:sp>
+        <p:nvSpPr>
+          <p:cNvPr id="38" name="Rounded Rectangle 37"/>
+          <p:cNvSpPr/>
+          <p:nvPr/>
+        </p:nvSpPr>
+        <p:spPr>
+          <a:xfrm>
+            <a:off x="7612452" y="3858341"/>
+            <a:ext cx="3997569" cy="833457"/>
+          </a:xfrm>
+          <a:prstGeom prst="roundRect">
+            <a:avLst/>
+          </a:prstGeom>
+          <a:noFill/>
+          <a:ln>
+            <a:solidFill>
+              <a:schemeClr val="bg2">
+                <a:lumMod val="50000"/>
+              </a:schemeClr>
+            </a:solidFill>
+          </a:ln>
+        </p:spPr>
+        <p:style>
+          <a:lnRef idx="2">
+            <a:schemeClr val="accent1">
+              <a:shade val="50000"/>
+            </a:schemeClr>
+          </a:lnRef>
+          <a:fillRef idx="1">
+            <a:schemeClr val="accent1"/>
+          </a:fillRef>
+          <a:effectRef idx="0">
+            <a:schemeClr val="accent1"/>
+          </a:effectRef>
+          <a:fontRef idx="minor">
+            <a:schemeClr val="lt1"/>
+          </a:fontRef>
+        </p:style>
+        <p:txBody>
+          <a:bodyPr rtlCol="0" anchor="ctr"/>
+          <a:lstStyle/>
+          <a:p>
+            <a:pPr algn="ctr"/>
+            <a:endParaRPr lang="en-AU"/>
+          </a:p>
+        </p:txBody>
+      </p:sp>
+      <p:sp>
+        <p:nvSpPr>
+          <p:cNvPr id="39" name="Rounded Rectangle 38"/>
+          <p:cNvSpPr/>
+          <p:nvPr/>
+        </p:nvSpPr>
+        <p:spPr>
+          <a:xfrm>
+            <a:off x="7605033" y="5349703"/>
+            <a:ext cx="3997569" cy="833457"/>
+          </a:xfrm>
+          <a:prstGeom prst="roundRect">
+            <a:avLst/>
+          </a:prstGeom>
+          <a:noFill/>
+          <a:ln>
+            <a:solidFill>
+              <a:schemeClr val="bg2">
+                <a:lumMod val="50000"/>
+              </a:schemeClr>
+            </a:solidFill>
+          </a:ln>
+        </p:spPr>
+        <p:style>
+          <a:lnRef idx="2">
+            <a:schemeClr val="accent1">
+              <a:shade val="50000"/>
+            </a:schemeClr>
+          </a:lnRef>
+          <a:fillRef idx="1">
+            <a:schemeClr val="accent1"/>
+          </a:fillRef>
+          <a:effectRef idx="0">
+            <a:schemeClr val="accent1"/>
+          </a:effectRef>
+          <a:fontRef idx="minor">
+            <a:schemeClr val="lt1"/>
+          </a:fontRef>
+        </p:style>
+        <p:txBody>
+          <a:bodyPr rtlCol="0" anchor="ctr"/>
+          <a:lstStyle/>
+          <a:p>
+            <a:pPr algn="ctr"/>
+            <a:endParaRPr lang="en-AU"/>
+          </a:p>
+        </p:txBody>
+      </p:sp>
+      <p:sp>
+        <p:nvSpPr>
+          <p:cNvPr id="36" name="Right Brace 35"/>
+          <p:cNvSpPr/>
+          <p:nvPr/>
+        </p:nvSpPr>
+        <p:spPr>
+          <a:xfrm>
+            <a:off x="7395431" y="2236122"/>
+            <a:ext cx="102474" cy="828592"/>
+          </a:xfrm>
+          <a:prstGeom prst="rightBrace">
+            <a:avLst/>
+          </a:prstGeom>
+          <a:ln w="12700">
+            <a:solidFill>
+              <a:schemeClr val="bg2">
+                <a:lumMod val="50000"/>
+              </a:schemeClr>
+            </a:solidFill>
+          </a:ln>
+        </p:spPr>
+        <p:style>
+          <a:lnRef idx="1">
+            <a:schemeClr val="dk1"/>
+          </a:lnRef>
+          <a:fillRef idx="0">
+            <a:schemeClr val="dk1"/>
+          </a:fillRef>
+          <a:effectRef idx="0">
+            <a:schemeClr val="dk1"/>
+          </a:effectRef>
+          <a:fontRef idx="minor">
+            <a:schemeClr val="tx1"/>
+          </a:fontRef>
+        </p:style>
+        <p:txBody>
+          <a:bodyPr rtlCol="0" anchor="ctr"/>
+          <a:lstStyle/>
+          <a:p>
+            <a:pPr algn="ctr"/>
+            <a:endParaRPr lang="en-AU"/>
+          </a:p>
+        </p:txBody>
+      </p:sp>
+      <p:sp>
+        <p:nvSpPr>
+          <p:cNvPr id="31" name="文本框 25"/>
+          <p:cNvSpPr txBox="1"/>
+          <p:nvPr/>
+        </p:nvSpPr>
+        <p:spPr>
+          <a:xfrm>
+            <a:off x="1444666" y="6109311"/>
+            <a:ext cx="2132315" cy="307777"/>
+          </a:xfrm>
+          <a:prstGeom prst="rect">
+            <a:avLst/>
+          </a:prstGeom>
+          <a:noFill/>
+        </p:spPr>
+        <p:txBody>
+          <a:bodyPr wrap="none" rtlCol="0">
+            <a:spAutoFit/>
+          </a:bodyPr>
+          <a:lstStyle/>
+          <a:p>
+            <a:pPr marL="285750" indent="-285750">
+              <a:buFont typeface="Wingdings" panose="05000000000000000000" pitchFamily="2" charset="2"/>
+              <a:buChar char="q"/>
+            </a:pPr>
+            <a:r>
+              <a:rPr lang="en-US" altLang="zh-CN" sz="1400" dirty="0"/>
+              <a:t>Discussion: Section 6.2</a:t>
+            </a:r>
+            <a:endParaRPr lang="zh-CN" altLang="en-US" sz="1400" dirty="0"/>
+          </a:p>
+        </p:txBody>
+      </p:sp>
+    </p:spTree>
+    <p:extLst>
+      <p:ext uri="{BB962C8B-B14F-4D97-AF65-F5344CB8AC3E}">
+        <p14:creationId xmlns:p14="http://schemas.microsoft.com/office/powerpoint/2010/main" val="1352020292"/>
+      </p:ext>
+    </p:extLst>
+  </p:cSld>
+  <p:clrMapOvr>
+    <a:masterClrMapping/>
+  </p:clrMapOvr>
+</p:sld>
+</file>
+
+<file path=ppt/slides/slide4.xml><?xml version="1.0" encoding="utf-8"?>
 <p:sld xmlns:a="http://schemas.openxmlformats.org/drawingml/2006/main" xmlns:r="http://schemas.openxmlformats.org/officeDocument/2006/relationships" xmlns:p="http://schemas.openxmlformats.org/presentationml/2006/main">
   <p:cSld>
     <p:spTree>
@@ -7531,7 +7999,7 @@
 </p:sld>
 </file>
 
-<file path=ppt/slides/slide4.xml><?xml version="1.0" encoding="utf-8"?>
+<file path=ppt/slides/slide5.xml><?xml version="1.0" encoding="utf-8"?>
 <p:sld xmlns:a="http://schemas.openxmlformats.org/drawingml/2006/main" xmlns:r="http://schemas.openxmlformats.org/officeDocument/2006/relationships" xmlns:p="http://schemas.openxmlformats.org/presentationml/2006/main">
   <p:cSld>
     <p:spTree>
@@ -8787,7 +9255,7 @@
 </p:sld>
 </file>
 
-<file path=ppt/slides/slide5.xml><?xml version="1.0" encoding="utf-8"?>
+<file path=ppt/slides/slide6.xml><?xml version="1.0" encoding="utf-8"?>
 <p:sld xmlns:a="http://schemas.openxmlformats.org/drawingml/2006/main" xmlns:r="http://schemas.openxmlformats.org/officeDocument/2006/relationships" xmlns:p="http://schemas.openxmlformats.org/presentationml/2006/main">
   <p:cSld>
     <p:spTree>
@@ -9109,7 +9577,7 @@
 </p:sld>
 </file>
 
-<file path=ppt/slides/slide6.xml><?xml version="1.0" encoding="utf-8"?>
+<file path=ppt/slides/slide7.xml><?xml version="1.0" encoding="utf-8"?>
 <p:sld xmlns:a="http://schemas.openxmlformats.org/drawingml/2006/main" xmlns:r="http://schemas.openxmlformats.org/officeDocument/2006/relationships" xmlns:p="http://schemas.openxmlformats.org/presentationml/2006/main">
   <p:cSld>
     <p:spTree>
@@ -9128,10 +9596,10 @@
       </p:grpSpPr>
       <p:pic>
         <p:nvPicPr>
-          <p:cNvPr id="3" name="图片 2">
+          <p:cNvPr id="5" name="图片 4">
             <a:extLst>
               <a:ext uri="{FF2B5EF4-FFF2-40B4-BE49-F238E27FC236}">
-                <a16:creationId xmlns:a16="http://schemas.microsoft.com/office/drawing/2014/main" id="{8F25978C-8657-4DF5-9B17-E00BCE8350FC}"/>
+                <a16:creationId xmlns:a16="http://schemas.microsoft.com/office/drawing/2014/main" id="{1CE1ECB8-7F5C-45BA-9891-2EF47593CE39}"/>
               </a:ext>
             </a:extLst>
           </p:cNvPr>
@@ -9154,8 +9622,8 @@
         </p:blipFill>
         <p:spPr>
           <a:xfrm>
-            <a:off x="3465638" y="1447151"/>
-            <a:ext cx="5395291" cy="5096262"/>
+            <a:off x="2965110" y="674622"/>
+            <a:ext cx="5524549" cy="5068370"/>
           </a:xfrm>
           <a:prstGeom prst="rect">
             <a:avLst/>
@@ -9176,7 +9644,7 @@
         </p:nvSpPr>
         <p:spPr>
           <a:xfrm>
-            <a:off x="4169916" y="4404220"/>
+            <a:off x="3767244" y="3531765"/>
             <a:ext cx="1066134" cy="261610"/>
           </a:xfrm>
           <a:prstGeom prst="rect">
@@ -9448,474 +9916,6 @@
     <p:extLst>
       <p:ext uri="{BB962C8B-B14F-4D97-AF65-F5344CB8AC3E}">
         <p14:creationId xmlns:p14="http://schemas.microsoft.com/office/powerpoint/2010/main" val="1282058643"/>
-      </p:ext>
-    </p:extLst>
-  </p:cSld>
-  <p:clrMapOvr>
-    <a:masterClrMapping/>
-  </p:clrMapOvr>
-</p:sld>
-</file>
-
-<file path=ppt/slides/slide7.xml><?xml version="1.0" encoding="utf-8"?>
-<p:sld xmlns:a="http://schemas.openxmlformats.org/drawingml/2006/main" xmlns:r="http://schemas.openxmlformats.org/officeDocument/2006/relationships" xmlns:p="http://schemas.openxmlformats.org/presentationml/2006/main">
-  <p:cSld>
-    <p:spTree>
-      <p:nvGrpSpPr>
-        <p:cNvPr id="1" name=""/>
-        <p:cNvGrpSpPr/>
-        <p:nvPr/>
-      </p:nvGrpSpPr>
-      <p:grpSpPr>
-        <a:xfrm>
-          <a:off x="0" y="0"/>
-          <a:ext cx="0" cy="0"/>
-          <a:chOff x="0" y="0"/>
-          <a:chExt cx="0" cy="0"/>
-        </a:xfrm>
-      </p:grpSpPr>
-      <p:pic>
-        <p:nvPicPr>
-          <p:cNvPr id="4" name="图片 3">
-            <a:extLst>
-              <a:ext uri="{FF2B5EF4-FFF2-40B4-BE49-F238E27FC236}">
-                <a16:creationId xmlns:a16="http://schemas.microsoft.com/office/drawing/2014/main" id="{0CC67A13-4353-4C33-A755-7653D597E5C9}"/>
-              </a:ext>
-            </a:extLst>
-          </p:cNvPr>
-          <p:cNvPicPr>
-            <a:picLocks noChangeAspect="1"/>
-          </p:cNvPicPr>
-          <p:nvPr/>
-        </p:nvPicPr>
-        <p:blipFill rotWithShape="1">
-          <a:blip r:embed="rId2" cstate="print">
-            <a:extLst>
-              <a:ext uri="{28A0092B-C50C-407E-A947-70E740481C1C}">
-                <a14:useLocalDpi xmlns:a14="http://schemas.microsoft.com/office/drawing/2010/main" val="0"/>
-              </a:ext>
-            </a:extLst>
-          </a:blip>
-          <a:srcRect l="29072" t="27151" r="19788" b="25181"/>
-          <a:stretch/>
-        </p:blipFill>
-        <p:spPr>
-          <a:xfrm>
-            <a:off x="3493651" y="1936391"/>
-            <a:ext cx="2498161" cy="3297637"/>
-          </a:xfrm>
-          <a:prstGeom prst="rect">
-            <a:avLst/>
-          </a:prstGeom>
-        </p:spPr>
-      </p:pic>
-      <p:grpSp>
-        <p:nvGrpSpPr>
-          <p:cNvPr id="15" name="组合 14">
-            <a:extLst>
-              <a:ext uri="{FF2B5EF4-FFF2-40B4-BE49-F238E27FC236}">
-                <a16:creationId xmlns:a16="http://schemas.microsoft.com/office/drawing/2014/main" id="{31524AA8-6E6C-4B31-B904-52C0F03ED427}"/>
-              </a:ext>
-            </a:extLst>
-          </p:cNvPr>
-          <p:cNvGrpSpPr/>
-          <p:nvPr/>
-        </p:nvGrpSpPr>
-        <p:grpSpPr>
-          <a:xfrm>
-            <a:off x="6065203" y="3665220"/>
-            <a:ext cx="1098958" cy="1467623"/>
-            <a:chOff x="5546521" y="962637"/>
-            <a:chExt cx="1098958" cy="1619075"/>
-          </a:xfrm>
-        </p:grpSpPr>
-        <p:pic>
-          <p:nvPicPr>
-            <p:cNvPr id="3" name="图片 2">
-              <a:extLst>
-                <a:ext uri="{FF2B5EF4-FFF2-40B4-BE49-F238E27FC236}">
-                  <a16:creationId xmlns:a16="http://schemas.microsoft.com/office/drawing/2014/main" id="{7FF24FA6-02FC-4BF6-9CA6-9F2684530128}"/>
-                </a:ext>
-              </a:extLst>
-            </p:cNvPr>
-            <p:cNvPicPr>
-              <a:picLocks noChangeAspect="1"/>
-            </p:cNvPicPr>
-            <p:nvPr/>
-          </p:nvPicPr>
-          <p:blipFill rotWithShape="1">
-            <a:blip r:embed="rId3" cstate="print">
-              <a:extLst>
-                <a:ext uri="{28A0092B-C50C-407E-A947-70E740481C1C}">
-                  <a14:useLocalDpi xmlns:a14="http://schemas.microsoft.com/office/drawing/2010/main" val="0"/>
-                </a:ext>
-              </a:extLst>
-            </a:blip>
-            <a:srcRect l="33601" t="41223" r="43706" b="35168"/>
-            <a:stretch/>
-          </p:blipFill>
-          <p:spPr>
-            <a:xfrm>
-              <a:off x="5546521" y="962637"/>
-              <a:ext cx="1098958" cy="1619075"/>
-            </a:xfrm>
-            <a:prstGeom prst="rect">
-              <a:avLst/>
-            </a:prstGeom>
-            <a:ln w="6350" cap="sq">
-              <a:solidFill>
-                <a:srgbClr val="000000"/>
-              </a:solidFill>
-              <a:prstDash val="solid"/>
-              <a:miter lim="800000"/>
-            </a:ln>
-            <a:effectLst>
-              <a:outerShdw blurRad="50800" dist="38100" dir="2700000" algn="tl" rotWithShape="0">
-                <a:srgbClr val="000000">
-                  <a:alpha val="43000"/>
-                </a:srgbClr>
-              </a:outerShdw>
-            </a:effectLst>
-          </p:spPr>
-        </p:pic>
-        <p:sp>
-          <p:nvSpPr>
-            <p:cNvPr id="16" name="文本框 15">
-              <a:extLst>
-                <a:ext uri="{FF2B5EF4-FFF2-40B4-BE49-F238E27FC236}">
-                  <a16:creationId xmlns:a16="http://schemas.microsoft.com/office/drawing/2014/main" id="{AB4F5715-82BB-4DCF-B59F-4FCCD142B838}"/>
-                </a:ext>
-              </a:extLst>
-            </p:cNvPr>
-            <p:cNvSpPr txBox="1"/>
-            <p:nvPr/>
-          </p:nvSpPr>
-          <p:spPr>
-            <a:xfrm>
-              <a:off x="5558605" y="2138328"/>
-              <a:ext cx="860684" cy="441400"/>
-            </a:xfrm>
-            <a:prstGeom prst="rect">
-              <a:avLst/>
-            </a:prstGeom>
-            <a:noFill/>
-          </p:spPr>
-          <p:txBody>
-            <a:bodyPr wrap="square" rtlCol="0">
-              <a:spAutoFit/>
-            </a:bodyPr>
-            <a:lstStyle/>
-            <a:p>
-              <a:r>
-                <a:rPr lang="en-US" altLang="zh-CN" sz="1000" dirty="0">
-                  <a:latin typeface="Arial" panose="020B0604020202020204" pitchFamily="34" charset="0"/>
-                  <a:cs typeface="Arial" panose="020B0604020202020204" pitchFamily="34" charset="0"/>
-                </a:rPr>
-                <a:t>Mackay Whitsunday</a:t>
-              </a:r>
-              <a:endParaRPr lang="zh-CN" altLang="en-US" sz="1000" dirty="0">
-                <a:latin typeface="Arial" panose="020B0604020202020204" pitchFamily="34" charset="0"/>
-                <a:cs typeface="Arial" panose="020B0604020202020204" pitchFamily="34" charset="0"/>
-              </a:endParaRPr>
-            </a:p>
-          </p:txBody>
-        </p:sp>
-      </p:grpSp>
-      <p:grpSp>
-        <p:nvGrpSpPr>
-          <p:cNvPr id="49" name="组合 48">
-            <a:extLst>
-              <a:ext uri="{FF2B5EF4-FFF2-40B4-BE49-F238E27FC236}">
-                <a16:creationId xmlns:a16="http://schemas.microsoft.com/office/drawing/2014/main" id="{EDDF3036-65C2-427D-B645-163807D421F5}"/>
-              </a:ext>
-            </a:extLst>
-          </p:cNvPr>
-          <p:cNvGrpSpPr/>
-          <p:nvPr/>
-        </p:nvGrpSpPr>
-        <p:grpSpPr>
-          <a:xfrm>
-            <a:off x="6022682" y="1960596"/>
-            <a:ext cx="1333599" cy="1543515"/>
-            <a:chOff x="6137629" y="723435"/>
-            <a:chExt cx="1486419" cy="1696920"/>
-          </a:xfrm>
-        </p:grpSpPr>
-        <p:pic>
-          <p:nvPicPr>
-            <p:cNvPr id="35" name="图片 34">
-              <a:extLst>
-                <a:ext uri="{FF2B5EF4-FFF2-40B4-BE49-F238E27FC236}">
-                  <a16:creationId xmlns:a16="http://schemas.microsoft.com/office/drawing/2014/main" id="{9DB24E35-FE28-44D5-BADA-85D851607CCF}"/>
-                </a:ext>
-              </a:extLst>
-            </p:cNvPr>
-            <p:cNvPicPr>
-              <a:picLocks noChangeAspect="1"/>
-            </p:cNvPicPr>
-            <p:nvPr/>
-          </p:nvPicPr>
-          <p:blipFill rotWithShape="1">
-            <a:blip r:embed="rId4" cstate="print">
-              <a:extLst>
-                <a:ext uri="{28A0092B-C50C-407E-A947-70E740481C1C}">
-                  <a14:useLocalDpi xmlns:a14="http://schemas.microsoft.com/office/drawing/2010/main" val="0"/>
-                </a:ext>
-              </a:extLst>
-            </a:blip>
-            <a:srcRect l="32377" t="30000" r="21047" b="31666"/>
-            <a:stretch/>
-          </p:blipFill>
-          <p:spPr>
-            <a:xfrm>
-              <a:off x="6168152" y="723435"/>
-              <a:ext cx="1455896" cy="1696920"/>
-            </a:xfrm>
-            <a:prstGeom prst="rect">
-              <a:avLst/>
-            </a:prstGeom>
-          </p:spPr>
-        </p:pic>
-        <p:sp>
-          <p:nvSpPr>
-            <p:cNvPr id="37" name="文本框 36">
-              <a:extLst>
-                <a:ext uri="{FF2B5EF4-FFF2-40B4-BE49-F238E27FC236}">
-                  <a16:creationId xmlns:a16="http://schemas.microsoft.com/office/drawing/2014/main" id="{A538FDC0-85C5-499D-8209-131D5EE26BCD}"/>
-                </a:ext>
-              </a:extLst>
-            </p:cNvPr>
-            <p:cNvSpPr txBox="1"/>
-            <p:nvPr/>
-          </p:nvSpPr>
-          <p:spPr>
-            <a:xfrm>
-              <a:off x="6137629" y="1490096"/>
-              <a:ext cx="1002926" cy="270692"/>
-            </a:xfrm>
-            <a:prstGeom prst="rect">
-              <a:avLst/>
-            </a:prstGeom>
-            <a:noFill/>
-          </p:spPr>
-          <p:txBody>
-            <a:bodyPr wrap="square" rtlCol="0">
-              <a:spAutoFit/>
-            </a:bodyPr>
-            <a:lstStyle/>
-            <a:p>
-              <a:r>
-                <a:rPr lang="en-US" altLang="zh-CN" sz="1000" dirty="0">
-                  <a:latin typeface="Arial" panose="020B0604020202020204" pitchFamily="34" charset="0"/>
-                  <a:cs typeface="Arial" panose="020B0604020202020204" pitchFamily="34" charset="0"/>
-                </a:rPr>
-                <a:t>Queensland</a:t>
-              </a:r>
-              <a:endParaRPr lang="zh-CN" altLang="en-US" sz="1000" dirty="0">
-                <a:latin typeface="Arial" panose="020B0604020202020204" pitchFamily="34" charset="0"/>
-                <a:cs typeface="Arial" panose="020B0604020202020204" pitchFamily="34" charset="0"/>
-              </a:endParaRPr>
-            </a:p>
-          </p:txBody>
-        </p:sp>
-      </p:grpSp>
-      <p:cxnSp>
-        <p:nvCxnSpPr>
-          <p:cNvPr id="11" name="直接连接符 10">
-            <a:extLst>
-              <a:ext uri="{FF2B5EF4-FFF2-40B4-BE49-F238E27FC236}">
-                <a16:creationId xmlns:a16="http://schemas.microsoft.com/office/drawing/2014/main" id="{3DC5AF13-4604-48BF-96B2-3A1CFC30C20C}"/>
-              </a:ext>
-            </a:extLst>
-          </p:cNvPr>
-          <p:cNvCxnSpPr>
-            <a:cxnSpLocks/>
-          </p:cNvCxnSpPr>
-          <p:nvPr/>
-        </p:nvCxnSpPr>
-        <p:spPr>
-          <a:xfrm flipV="1">
-            <a:off x="6065203" y="2732353"/>
-            <a:ext cx="830717" cy="931068"/>
-          </a:xfrm>
-          <a:prstGeom prst="line">
-            <a:avLst/>
-          </a:prstGeom>
-          <a:ln>
-            <a:solidFill>
-              <a:schemeClr val="bg1">
-                <a:lumMod val="50000"/>
-              </a:schemeClr>
-            </a:solidFill>
-            <a:prstDash val="lgDashDot"/>
-          </a:ln>
-        </p:spPr>
-        <p:style>
-          <a:lnRef idx="1">
-            <a:schemeClr val="dk1"/>
-          </a:lnRef>
-          <a:fillRef idx="0">
-            <a:schemeClr val="dk1"/>
-          </a:fillRef>
-          <a:effectRef idx="0">
-            <a:schemeClr val="dk1"/>
-          </a:effectRef>
-          <a:fontRef idx="minor">
-            <a:schemeClr val="tx1"/>
-          </a:fontRef>
-        </p:style>
-      </p:cxnSp>
-      <p:cxnSp>
-        <p:nvCxnSpPr>
-          <p:cNvPr id="13" name="直接连接符 12">
-            <a:extLst>
-              <a:ext uri="{FF2B5EF4-FFF2-40B4-BE49-F238E27FC236}">
-                <a16:creationId xmlns:a16="http://schemas.microsoft.com/office/drawing/2014/main" id="{65BBB974-E86C-4CC0-954B-929C2ECA6370}"/>
-              </a:ext>
-            </a:extLst>
-          </p:cNvPr>
-          <p:cNvCxnSpPr>
-            <a:cxnSpLocks/>
-          </p:cNvCxnSpPr>
-          <p:nvPr/>
-        </p:nvCxnSpPr>
-        <p:spPr>
-          <a:xfrm>
-            <a:off x="7012430" y="2925445"/>
-            <a:ext cx="154906" cy="736600"/>
-          </a:xfrm>
-          <a:prstGeom prst="line">
-            <a:avLst/>
-          </a:prstGeom>
-          <a:ln>
-            <a:solidFill>
-              <a:schemeClr val="bg1">
-                <a:lumMod val="50000"/>
-              </a:schemeClr>
-            </a:solidFill>
-            <a:prstDash val="lgDashDot"/>
-          </a:ln>
-        </p:spPr>
-        <p:style>
-          <a:lnRef idx="1">
-            <a:schemeClr val="dk1"/>
-          </a:lnRef>
-          <a:fillRef idx="0">
-            <a:schemeClr val="dk1"/>
-          </a:fillRef>
-          <a:effectRef idx="0">
-            <a:schemeClr val="dk1"/>
-          </a:effectRef>
-          <a:fontRef idx="minor">
-            <a:schemeClr val="tx1"/>
-          </a:fontRef>
-        </p:style>
-      </p:cxnSp>
-      <p:sp>
-        <p:nvSpPr>
-          <p:cNvPr id="75" name="矩形 74">
-            <a:extLst>
-              <a:ext uri="{FF2B5EF4-FFF2-40B4-BE49-F238E27FC236}">
-                <a16:creationId xmlns:a16="http://schemas.microsoft.com/office/drawing/2014/main" id="{25A8C9AB-8A67-49D9-8A91-B4A7003B0EC3}"/>
-              </a:ext>
-            </a:extLst>
-          </p:cNvPr>
-          <p:cNvSpPr/>
-          <p:nvPr/>
-        </p:nvSpPr>
-        <p:spPr>
-          <a:xfrm>
-            <a:off x="3401482" y="1744980"/>
-            <a:ext cx="3954799" cy="3680460"/>
-          </a:xfrm>
-          <a:prstGeom prst="rect">
-            <a:avLst/>
-          </a:prstGeom>
-          <a:noFill/>
-          <a:ln>
-            <a:solidFill>
-              <a:schemeClr val="bg2">
-                <a:lumMod val="25000"/>
-              </a:schemeClr>
-            </a:solidFill>
-          </a:ln>
-        </p:spPr>
-        <p:style>
-          <a:lnRef idx="2">
-            <a:schemeClr val="accent1">
-              <a:shade val="50000"/>
-            </a:schemeClr>
-          </a:lnRef>
-          <a:fillRef idx="1">
-            <a:schemeClr val="accent1"/>
-          </a:fillRef>
-          <a:effectRef idx="0">
-            <a:schemeClr val="accent1"/>
-          </a:effectRef>
-          <a:fontRef idx="minor">
-            <a:schemeClr val="lt1"/>
-          </a:fontRef>
-        </p:style>
-        <p:txBody>
-          <a:bodyPr rtlCol="0" anchor="ctr"/>
-          <a:lstStyle/>
-          <a:p>
-            <a:pPr algn="ctr"/>
-            <a:endParaRPr lang="zh-CN" altLang="en-US"/>
-          </a:p>
-        </p:txBody>
-      </p:sp>
-      <p:cxnSp>
-        <p:nvCxnSpPr>
-          <p:cNvPr id="42" name="直接连接符 41">
-            <a:extLst>
-              <a:ext uri="{FF2B5EF4-FFF2-40B4-BE49-F238E27FC236}">
-                <a16:creationId xmlns:a16="http://schemas.microsoft.com/office/drawing/2014/main" id="{640A820C-7239-4EAC-85D5-003C6598E48C}"/>
-              </a:ext>
-            </a:extLst>
-          </p:cNvPr>
-          <p:cNvCxnSpPr>
-            <a:cxnSpLocks/>
-          </p:cNvCxnSpPr>
-          <p:nvPr/>
-        </p:nvCxnSpPr>
-        <p:spPr>
-          <a:xfrm flipH="1" flipV="1">
-            <a:off x="5608320" y="3824530"/>
-            <a:ext cx="701040" cy="374700"/>
-          </a:xfrm>
-          <a:prstGeom prst="line">
-            <a:avLst/>
-          </a:prstGeom>
-          <a:ln w="9525" cap="flat" cmpd="sng" algn="ctr">
-            <a:solidFill>
-              <a:schemeClr val="dk1"/>
-            </a:solidFill>
-            <a:prstDash val="solid"/>
-            <a:round/>
-            <a:headEnd type="none" w="med" len="med"/>
-            <a:tailEnd type="arrow" w="med" len="med"/>
-          </a:ln>
-        </p:spPr>
-        <p:style>
-          <a:lnRef idx="0">
-            <a:scrgbClr r="0" g="0" b="0"/>
-          </a:lnRef>
-          <a:fillRef idx="0">
-            <a:scrgbClr r="0" g="0" b="0"/>
-          </a:fillRef>
-          <a:effectRef idx="0">
-            <a:scrgbClr r="0" g="0" b="0"/>
-          </a:effectRef>
-          <a:fontRef idx="minor">
-            <a:schemeClr val="tx1"/>
-          </a:fontRef>
-        </p:style>
-      </p:cxnSp>
-    </p:spTree>
-    <p:extLst>
-      <p:ext uri="{BB962C8B-B14F-4D97-AF65-F5344CB8AC3E}">
-        <p14:creationId xmlns:p14="http://schemas.microsoft.com/office/powerpoint/2010/main" val="2836170125"/>
       </p:ext>
     </p:extLst>
   </p:cSld>

</xml_diff>